<commit_message>
Update the workshop to make use of the package
</commit_message>
<xml_diff>
--- a/images/File to edit images.pptx
+++ b/images/File to edit images.pptx
@@ -7,6 +7,17 @@
   <p:sldIdLst>
     <p:sldId id="256" r:id="rId2"/>
     <p:sldId id="257" r:id="rId3"/>
+    <p:sldId id="259" r:id="rId4"/>
+    <p:sldId id="260" r:id="rId5"/>
+    <p:sldId id="261" r:id="rId6"/>
+    <p:sldId id="258" r:id="rId7"/>
+    <p:sldId id="262" r:id="rId8"/>
+    <p:sldId id="263" r:id="rId9"/>
+    <p:sldId id="264" r:id="rId10"/>
+    <p:sldId id="266" r:id="rId11"/>
+    <p:sldId id="267" r:id="rId12"/>
+    <p:sldId id="268" r:id="rId13"/>
+    <p:sldId id="265" r:id="rId14"/>
   </p:sldIdLst>
   <p:sldSz cx="12192000" cy="6858000"/>
   <p:notesSz cx="6858000" cy="9144000"/>
@@ -105,6 +116,11 @@
       </a:defRPr>
     </a:lvl9pPr>
   </p:defaultTextStyle>
+  <p:extLst>
+    <p:ext uri="{EFAFB233-063F-42B5-8137-9DF3F51BA10A}">
+      <p15:sldGuideLst xmlns:p15="http://schemas.microsoft.com/office/powerpoint/2012/main"/>
+    </p:ext>
+  </p:extLst>
 </p:presentation>
 </file>
 
@@ -257,7 +273,7 @@
           <a:p>
             <a:fld id="{521112BD-4317-EF4B-B0B3-CDEC7117EED6}" type="datetimeFigureOut">
               <a:rPr lang="en-NL" smtClean="0"/>
-              <a:t>16/04/2024</a:t>
+              <a:t>22/04/2024</a:t>
             </a:fld>
             <a:endParaRPr lang="en-NL"/>
           </a:p>
@@ -457,7 +473,7 @@
           <a:p>
             <a:fld id="{521112BD-4317-EF4B-B0B3-CDEC7117EED6}" type="datetimeFigureOut">
               <a:rPr lang="en-NL" smtClean="0"/>
-              <a:t>16/04/2024</a:t>
+              <a:t>22/04/2024</a:t>
             </a:fld>
             <a:endParaRPr lang="en-NL"/>
           </a:p>
@@ -667,7 +683,7 @@
           <a:p>
             <a:fld id="{521112BD-4317-EF4B-B0B3-CDEC7117EED6}" type="datetimeFigureOut">
               <a:rPr lang="en-NL" smtClean="0"/>
-              <a:t>16/04/2024</a:t>
+              <a:t>22/04/2024</a:t>
             </a:fld>
             <a:endParaRPr lang="en-NL"/>
           </a:p>
@@ -867,7 +883,7 @@
           <a:p>
             <a:fld id="{521112BD-4317-EF4B-B0B3-CDEC7117EED6}" type="datetimeFigureOut">
               <a:rPr lang="en-NL" smtClean="0"/>
-              <a:t>16/04/2024</a:t>
+              <a:t>22/04/2024</a:t>
             </a:fld>
             <a:endParaRPr lang="en-NL"/>
           </a:p>
@@ -1143,7 +1159,7 @@
           <a:p>
             <a:fld id="{521112BD-4317-EF4B-B0B3-CDEC7117EED6}" type="datetimeFigureOut">
               <a:rPr lang="en-NL" smtClean="0"/>
-              <a:t>16/04/2024</a:t>
+              <a:t>22/04/2024</a:t>
             </a:fld>
             <a:endParaRPr lang="en-NL"/>
           </a:p>
@@ -1411,7 +1427,7 @@
           <a:p>
             <a:fld id="{521112BD-4317-EF4B-B0B3-CDEC7117EED6}" type="datetimeFigureOut">
               <a:rPr lang="en-NL" smtClean="0"/>
-              <a:t>16/04/2024</a:t>
+              <a:t>22/04/2024</a:t>
             </a:fld>
             <a:endParaRPr lang="en-NL"/>
           </a:p>
@@ -1826,7 +1842,7 @@
           <a:p>
             <a:fld id="{521112BD-4317-EF4B-B0B3-CDEC7117EED6}" type="datetimeFigureOut">
               <a:rPr lang="en-NL" smtClean="0"/>
-              <a:t>16/04/2024</a:t>
+              <a:t>22/04/2024</a:t>
             </a:fld>
             <a:endParaRPr lang="en-NL"/>
           </a:p>
@@ -1968,7 +1984,7 @@
           <a:p>
             <a:fld id="{521112BD-4317-EF4B-B0B3-CDEC7117EED6}" type="datetimeFigureOut">
               <a:rPr lang="en-NL" smtClean="0"/>
-              <a:t>16/04/2024</a:t>
+              <a:t>22/04/2024</a:t>
             </a:fld>
             <a:endParaRPr lang="en-NL"/>
           </a:p>
@@ -2081,7 +2097,7 @@
           <a:p>
             <a:fld id="{521112BD-4317-EF4B-B0B3-CDEC7117EED6}" type="datetimeFigureOut">
               <a:rPr lang="en-NL" smtClean="0"/>
-              <a:t>16/04/2024</a:t>
+              <a:t>22/04/2024</a:t>
             </a:fld>
             <a:endParaRPr lang="en-NL"/>
           </a:p>
@@ -2394,7 +2410,7 @@
           <a:p>
             <a:fld id="{521112BD-4317-EF4B-B0B3-CDEC7117EED6}" type="datetimeFigureOut">
               <a:rPr lang="en-NL" smtClean="0"/>
-              <a:t>16/04/2024</a:t>
+              <a:t>22/04/2024</a:t>
             </a:fld>
             <a:endParaRPr lang="en-NL"/>
           </a:p>
@@ -2683,7 +2699,7 @@
           <a:p>
             <a:fld id="{521112BD-4317-EF4B-B0B3-CDEC7117EED6}" type="datetimeFigureOut">
               <a:rPr lang="en-NL" smtClean="0"/>
-              <a:t>16/04/2024</a:t>
+              <a:t>22/04/2024</a:t>
             </a:fld>
             <a:endParaRPr lang="en-NL"/>
           </a:p>
@@ -2926,7 +2942,7 @@
           <a:p>
             <a:fld id="{521112BD-4317-EF4B-B0B3-CDEC7117EED6}" type="datetimeFigureOut">
               <a:rPr lang="en-NL" smtClean="0"/>
-              <a:t>16/04/2024</a:t>
+              <a:t>22/04/2024</a:t>
             </a:fld>
             <a:endParaRPr lang="en-NL"/>
           </a:p>
@@ -3427,6 +3443,623 @@
 </p:sld>
 </file>
 
+<file path=ppt/slides/slide10.xml><?xml version="1.0" encoding="utf-8"?>
+<p:sld xmlns:a="http://schemas.openxmlformats.org/drawingml/2006/main" xmlns:r="http://schemas.openxmlformats.org/officeDocument/2006/relationships" xmlns:p="http://schemas.openxmlformats.org/presentationml/2006/main">
+  <p:cSld>
+    <p:spTree>
+      <p:nvGrpSpPr>
+        <p:cNvPr id="1" name=""/>
+        <p:cNvGrpSpPr/>
+        <p:nvPr/>
+      </p:nvGrpSpPr>
+      <p:grpSpPr>
+        <a:xfrm>
+          <a:off x="0" y="0"/>
+          <a:ext cx="0" cy="0"/>
+          <a:chOff x="0" y="0"/>
+          <a:chExt cx="0" cy="0"/>
+        </a:xfrm>
+      </p:grpSpPr>
+      <p:sp>
+        <p:nvSpPr>
+          <p:cNvPr id="2" name="Title 1">
+            <a:extLst>
+              <a:ext uri="{FF2B5EF4-FFF2-40B4-BE49-F238E27FC236}">
+                <a16:creationId xmlns:a16="http://schemas.microsoft.com/office/drawing/2014/main" id="{8DD296A9-328C-C3E1-D836-B1CA7049CC9A}"/>
+              </a:ext>
+            </a:extLst>
+          </p:cNvPr>
+          <p:cNvSpPr>
+            <a:spLocks noGrp="1"/>
+          </p:cNvSpPr>
+          <p:nvPr>
+            <p:ph type="title"/>
+          </p:nvPr>
+        </p:nvSpPr>
+        <p:spPr/>
+        <p:txBody>
+          <a:bodyPr/>
+          <a:lstStyle/>
+          <a:p>
+            <a:endParaRPr lang="en-NL" dirty="0"/>
+          </a:p>
+        </p:txBody>
+      </p:sp>
+      <p:pic>
+        <p:nvPicPr>
+          <p:cNvPr id="4" name="Picture 3" descr="A screenshot of a computer&#10;&#10;Description automatically generated">
+            <a:extLst>
+              <a:ext uri="{FF2B5EF4-FFF2-40B4-BE49-F238E27FC236}">
+                <a16:creationId xmlns:a16="http://schemas.microsoft.com/office/drawing/2014/main" id="{6946CB4E-6E64-0F81-C37B-5123690263A8}"/>
+              </a:ext>
+            </a:extLst>
+          </p:cNvPr>
+          <p:cNvPicPr>
+            <a:picLocks noChangeAspect="1"/>
+          </p:cNvPicPr>
+          <p:nvPr/>
+        </p:nvPicPr>
+        <p:blipFill rotWithShape="1">
+          <a:blip r:embed="rId2"/>
+          <a:srcRect l="60136" t="40194"/>
+          <a:stretch/>
+        </p:blipFill>
+        <p:spPr>
+          <a:xfrm>
+            <a:off x="5527964" y="2223655"/>
+            <a:ext cx="3098352" cy="3040607"/>
+          </a:xfrm>
+          <a:prstGeom prst="rect">
+            <a:avLst/>
+          </a:prstGeom>
+        </p:spPr>
+      </p:pic>
+      <p:sp>
+        <p:nvSpPr>
+          <p:cNvPr id="5" name="Rectangle 4">
+            <a:extLst>
+              <a:ext uri="{FF2B5EF4-FFF2-40B4-BE49-F238E27FC236}">
+                <a16:creationId xmlns:a16="http://schemas.microsoft.com/office/drawing/2014/main" id="{C05CD0BB-C2B5-53B2-EB15-2F06F804B4D2}"/>
+              </a:ext>
+            </a:extLst>
+          </p:cNvPr>
+          <p:cNvSpPr/>
+          <p:nvPr/>
+        </p:nvSpPr>
+        <p:spPr>
+          <a:xfrm>
+            <a:off x="7695247" y="2879819"/>
+            <a:ext cx="797590" cy="1320036"/>
+          </a:xfrm>
+          <a:prstGeom prst="rect">
+            <a:avLst/>
+          </a:prstGeom>
+          <a:ln>
+            <a:solidFill>
+              <a:schemeClr val="bg1"/>
+            </a:solidFill>
+          </a:ln>
+        </p:spPr>
+        <p:style>
+          <a:lnRef idx="2">
+            <a:schemeClr val="accent6"/>
+          </a:lnRef>
+          <a:fillRef idx="1">
+            <a:schemeClr val="lt1"/>
+          </a:fillRef>
+          <a:effectRef idx="0">
+            <a:schemeClr val="accent6"/>
+          </a:effectRef>
+          <a:fontRef idx="minor">
+            <a:schemeClr val="dk1"/>
+          </a:fontRef>
+        </p:style>
+        <p:txBody>
+          <a:bodyPr rtlCol="0" anchor="ctr"/>
+          <a:lstStyle/>
+          <a:p>
+            <a:pPr algn="ctr"/>
+            <a:endParaRPr lang="en-NL"/>
+          </a:p>
+        </p:txBody>
+      </p:sp>
+      <p:cxnSp>
+        <p:nvCxnSpPr>
+          <p:cNvPr id="6" name="Straight Arrow Connector 5">
+            <a:extLst>
+              <a:ext uri="{FF2B5EF4-FFF2-40B4-BE49-F238E27FC236}">
+                <a16:creationId xmlns:a16="http://schemas.microsoft.com/office/drawing/2014/main" id="{B262FA30-6ACD-9F05-3241-2B50B49D04D4}"/>
+              </a:ext>
+            </a:extLst>
+          </p:cNvPr>
+          <p:cNvCxnSpPr>
+            <a:cxnSpLocks/>
+          </p:cNvCxnSpPr>
+          <p:nvPr/>
+        </p:nvCxnSpPr>
+        <p:spPr>
+          <a:xfrm flipH="1">
+            <a:off x="7576271" y="3472158"/>
+            <a:ext cx="623888" cy="0"/>
+          </a:xfrm>
+          <a:prstGeom prst="straightConnector1">
+            <a:avLst/>
+          </a:prstGeom>
+          <a:ln w="50800">
+            <a:tailEnd type="triangle"/>
+          </a:ln>
+        </p:spPr>
+        <p:style>
+          <a:lnRef idx="3">
+            <a:schemeClr val="accent5"/>
+          </a:lnRef>
+          <a:fillRef idx="0">
+            <a:schemeClr val="accent5"/>
+          </a:fillRef>
+          <a:effectRef idx="2">
+            <a:schemeClr val="accent5"/>
+          </a:effectRef>
+          <a:fontRef idx="minor">
+            <a:schemeClr val="tx1"/>
+          </a:fontRef>
+        </p:style>
+      </p:cxnSp>
+      <p:sp>
+        <p:nvSpPr>
+          <p:cNvPr id="10" name="Content Placeholder 9">
+            <a:extLst>
+              <a:ext uri="{FF2B5EF4-FFF2-40B4-BE49-F238E27FC236}">
+                <a16:creationId xmlns:a16="http://schemas.microsoft.com/office/drawing/2014/main" id="{A725895A-EACF-9111-F5CC-5676416FCF79}"/>
+              </a:ext>
+            </a:extLst>
+          </p:cNvPr>
+          <p:cNvSpPr>
+            <a:spLocks noGrp="1"/>
+          </p:cNvSpPr>
+          <p:nvPr>
+            <p:ph idx="1"/>
+          </p:nvPr>
+        </p:nvSpPr>
+        <p:spPr/>
+        <p:txBody>
+          <a:bodyPr/>
+          <a:lstStyle/>
+          <a:p>
+            <a:endParaRPr lang="en-NL"/>
+          </a:p>
+        </p:txBody>
+      </p:sp>
+    </p:spTree>
+    <p:extLst>
+      <p:ext uri="{BB962C8B-B14F-4D97-AF65-F5344CB8AC3E}">
+        <p14:creationId xmlns:p14="http://schemas.microsoft.com/office/powerpoint/2010/main" val="260101886"/>
+      </p:ext>
+    </p:extLst>
+  </p:cSld>
+  <p:clrMapOvr>
+    <a:masterClrMapping/>
+  </p:clrMapOvr>
+</p:sld>
+</file>
+
+<file path=ppt/slides/slide11.xml><?xml version="1.0" encoding="utf-8"?>
+<p:sld xmlns:a="http://schemas.openxmlformats.org/drawingml/2006/main" xmlns:r="http://schemas.openxmlformats.org/officeDocument/2006/relationships" xmlns:p="http://schemas.openxmlformats.org/presentationml/2006/main">
+  <p:cSld>
+    <p:spTree>
+      <p:nvGrpSpPr>
+        <p:cNvPr id="1" name=""/>
+        <p:cNvGrpSpPr/>
+        <p:nvPr/>
+      </p:nvGrpSpPr>
+      <p:grpSpPr>
+        <a:xfrm>
+          <a:off x="0" y="0"/>
+          <a:ext cx="0" cy="0"/>
+          <a:chOff x="0" y="0"/>
+          <a:chExt cx="0" cy="0"/>
+        </a:xfrm>
+      </p:grpSpPr>
+      <p:pic>
+        <p:nvPicPr>
+          <p:cNvPr id="4" name="Picture 3" descr="A screenshot of a computer&#10;&#10;Description automatically generated">
+            <a:extLst>
+              <a:ext uri="{FF2B5EF4-FFF2-40B4-BE49-F238E27FC236}">
+                <a16:creationId xmlns:a16="http://schemas.microsoft.com/office/drawing/2014/main" id="{7DC35673-BE59-CF44-8ED1-19F535E3CE19}"/>
+              </a:ext>
+            </a:extLst>
+          </p:cNvPr>
+          <p:cNvPicPr>
+            <a:picLocks noChangeAspect="1"/>
+          </p:cNvPicPr>
+          <p:nvPr/>
+        </p:nvPicPr>
+        <p:blipFill>
+          <a:blip r:embed="rId2"/>
+          <a:stretch>
+            <a:fillRect/>
+          </a:stretch>
+        </p:blipFill>
+        <p:spPr>
+          <a:xfrm>
+            <a:off x="853916" y="337742"/>
+            <a:ext cx="7772400" cy="5084153"/>
+          </a:xfrm>
+          <a:prstGeom prst="rect">
+            <a:avLst/>
+          </a:prstGeom>
+        </p:spPr>
+      </p:pic>
+      <p:sp>
+        <p:nvSpPr>
+          <p:cNvPr id="5" name="Rectangle 4">
+            <a:extLst>
+              <a:ext uri="{FF2B5EF4-FFF2-40B4-BE49-F238E27FC236}">
+                <a16:creationId xmlns:a16="http://schemas.microsoft.com/office/drawing/2014/main" id="{4F053620-6542-5907-7D35-17D9C66851FC}"/>
+              </a:ext>
+            </a:extLst>
+          </p:cNvPr>
+          <p:cNvSpPr/>
+          <p:nvPr/>
+        </p:nvSpPr>
+        <p:spPr>
+          <a:xfrm>
+            <a:off x="7695247" y="2879819"/>
+            <a:ext cx="797590" cy="1320036"/>
+          </a:xfrm>
+          <a:prstGeom prst="rect">
+            <a:avLst/>
+          </a:prstGeom>
+          <a:ln>
+            <a:solidFill>
+              <a:schemeClr val="bg1"/>
+            </a:solidFill>
+          </a:ln>
+        </p:spPr>
+        <p:style>
+          <a:lnRef idx="2">
+            <a:schemeClr val="accent6"/>
+          </a:lnRef>
+          <a:fillRef idx="1">
+            <a:schemeClr val="lt1"/>
+          </a:fillRef>
+          <a:effectRef idx="0">
+            <a:schemeClr val="accent6"/>
+          </a:effectRef>
+          <a:fontRef idx="minor">
+            <a:schemeClr val="dk1"/>
+          </a:fontRef>
+        </p:style>
+        <p:txBody>
+          <a:bodyPr rtlCol="0" anchor="ctr"/>
+          <a:lstStyle/>
+          <a:p>
+            <a:pPr algn="ctr"/>
+            <a:endParaRPr lang="en-NL"/>
+          </a:p>
+        </p:txBody>
+      </p:sp>
+      <p:cxnSp>
+        <p:nvCxnSpPr>
+          <p:cNvPr id="6" name="Straight Arrow Connector 5">
+            <a:extLst>
+              <a:ext uri="{FF2B5EF4-FFF2-40B4-BE49-F238E27FC236}">
+                <a16:creationId xmlns:a16="http://schemas.microsoft.com/office/drawing/2014/main" id="{F7D91EBF-B07B-236D-3DBB-8E18ABD80A24}"/>
+              </a:ext>
+            </a:extLst>
+          </p:cNvPr>
+          <p:cNvCxnSpPr>
+            <a:cxnSpLocks/>
+          </p:cNvCxnSpPr>
+          <p:nvPr/>
+        </p:nvCxnSpPr>
+        <p:spPr>
+          <a:xfrm flipH="1">
+            <a:off x="7544373" y="3509371"/>
+            <a:ext cx="623888" cy="0"/>
+          </a:xfrm>
+          <a:prstGeom prst="straightConnector1">
+            <a:avLst/>
+          </a:prstGeom>
+          <a:ln w="50800">
+            <a:tailEnd type="triangle"/>
+          </a:ln>
+        </p:spPr>
+        <p:style>
+          <a:lnRef idx="3">
+            <a:schemeClr val="accent5"/>
+          </a:lnRef>
+          <a:fillRef idx="0">
+            <a:schemeClr val="accent5"/>
+          </a:fillRef>
+          <a:effectRef idx="2">
+            <a:schemeClr val="accent5"/>
+          </a:effectRef>
+          <a:fontRef idx="minor">
+            <a:schemeClr val="tx1"/>
+          </a:fontRef>
+        </p:style>
+      </p:cxnSp>
+    </p:spTree>
+    <p:extLst>
+      <p:ext uri="{BB962C8B-B14F-4D97-AF65-F5344CB8AC3E}">
+        <p14:creationId xmlns:p14="http://schemas.microsoft.com/office/powerpoint/2010/main" val="3828853426"/>
+      </p:ext>
+    </p:extLst>
+  </p:cSld>
+  <p:clrMapOvr>
+    <a:masterClrMapping/>
+  </p:clrMapOvr>
+</p:sld>
+</file>
+
+<file path=ppt/slides/slide12.xml><?xml version="1.0" encoding="utf-8"?>
+<p:sld xmlns:a="http://schemas.openxmlformats.org/drawingml/2006/main" xmlns:r="http://schemas.openxmlformats.org/officeDocument/2006/relationships" xmlns:p="http://schemas.openxmlformats.org/presentationml/2006/main">
+  <p:cSld>
+    <p:spTree>
+      <p:nvGrpSpPr>
+        <p:cNvPr id="1" name=""/>
+        <p:cNvGrpSpPr/>
+        <p:nvPr/>
+      </p:nvGrpSpPr>
+      <p:grpSpPr>
+        <a:xfrm>
+          <a:off x="0" y="0"/>
+          <a:ext cx="0" cy="0"/>
+          <a:chOff x="0" y="0"/>
+          <a:chExt cx="0" cy="0"/>
+        </a:xfrm>
+      </p:grpSpPr>
+      <p:sp>
+        <p:nvSpPr>
+          <p:cNvPr id="2" name="Title 1">
+            <a:extLst>
+              <a:ext uri="{FF2B5EF4-FFF2-40B4-BE49-F238E27FC236}">
+                <a16:creationId xmlns:a16="http://schemas.microsoft.com/office/drawing/2014/main" id="{C165278E-13CF-2B5E-75A2-58CD74A704A7}"/>
+              </a:ext>
+            </a:extLst>
+          </p:cNvPr>
+          <p:cNvSpPr>
+            <a:spLocks noGrp="1"/>
+          </p:cNvSpPr>
+          <p:nvPr>
+            <p:ph type="title"/>
+          </p:nvPr>
+        </p:nvSpPr>
+        <p:spPr/>
+        <p:txBody>
+          <a:bodyPr/>
+          <a:lstStyle/>
+          <a:p>
+            <a:endParaRPr lang="en-NL"/>
+          </a:p>
+        </p:txBody>
+      </p:sp>
+      <p:sp>
+        <p:nvSpPr>
+          <p:cNvPr id="3" name="Content Placeholder 2">
+            <a:extLst>
+              <a:ext uri="{FF2B5EF4-FFF2-40B4-BE49-F238E27FC236}">
+                <a16:creationId xmlns:a16="http://schemas.microsoft.com/office/drawing/2014/main" id="{B621E2AB-5E17-51DF-664A-397664336E15}"/>
+              </a:ext>
+            </a:extLst>
+          </p:cNvPr>
+          <p:cNvSpPr>
+            <a:spLocks noGrp="1"/>
+          </p:cNvSpPr>
+          <p:nvPr>
+            <p:ph idx="1"/>
+          </p:nvPr>
+        </p:nvSpPr>
+        <p:spPr/>
+        <p:txBody>
+          <a:bodyPr/>
+          <a:lstStyle/>
+          <a:p>
+            <a:endParaRPr lang="en-NL" dirty="0"/>
+          </a:p>
+        </p:txBody>
+      </p:sp>
+      <p:pic>
+        <p:nvPicPr>
+          <p:cNvPr id="4" name="Content Placeholder 7" descr="A screenshot of a computer&#10;&#10;Description automatically generated">
+            <a:extLst>
+              <a:ext uri="{FF2B5EF4-FFF2-40B4-BE49-F238E27FC236}">
+                <a16:creationId xmlns:a16="http://schemas.microsoft.com/office/drawing/2014/main" id="{469AC956-9283-7E45-5C7E-A23B1FE34103}"/>
+              </a:ext>
+            </a:extLst>
+          </p:cNvPr>
+          <p:cNvPicPr>
+            <a:picLocks noChangeAspect="1"/>
+          </p:cNvPicPr>
+          <p:nvPr/>
+        </p:nvPicPr>
+        <p:blipFill>
+          <a:blip r:embed="rId2"/>
+          <a:stretch>
+            <a:fillRect/>
+          </a:stretch>
+        </p:blipFill>
+        <p:spPr>
+          <a:xfrm>
+            <a:off x="2108200" y="2293144"/>
+            <a:ext cx="7975600" cy="3416300"/>
+          </a:xfrm>
+          <a:prstGeom prst="rect">
+            <a:avLst/>
+          </a:prstGeom>
+        </p:spPr>
+      </p:pic>
+      <p:sp>
+        <p:nvSpPr>
+          <p:cNvPr id="5" name="Rectangle 4">
+            <a:extLst>
+              <a:ext uri="{FF2B5EF4-FFF2-40B4-BE49-F238E27FC236}">
+                <a16:creationId xmlns:a16="http://schemas.microsoft.com/office/drawing/2014/main" id="{6BBA3D43-7C03-F9D5-D0A6-68EDCE905EE0}"/>
+              </a:ext>
+            </a:extLst>
+          </p:cNvPr>
+          <p:cNvSpPr/>
+          <p:nvPr/>
+        </p:nvSpPr>
+        <p:spPr>
+          <a:xfrm>
+            <a:off x="7886633" y="3624098"/>
+            <a:ext cx="1991014" cy="1320036"/>
+          </a:xfrm>
+          <a:prstGeom prst="rect">
+            <a:avLst/>
+          </a:prstGeom>
+          <a:ln>
+            <a:solidFill>
+              <a:schemeClr val="bg1"/>
+            </a:solidFill>
+          </a:ln>
+        </p:spPr>
+        <p:style>
+          <a:lnRef idx="2">
+            <a:schemeClr val="accent6"/>
+          </a:lnRef>
+          <a:fillRef idx="1">
+            <a:schemeClr val="lt1"/>
+          </a:fillRef>
+          <a:effectRef idx="0">
+            <a:schemeClr val="accent6"/>
+          </a:effectRef>
+          <a:fontRef idx="minor">
+            <a:schemeClr val="dk1"/>
+          </a:fontRef>
+        </p:style>
+        <p:txBody>
+          <a:bodyPr rtlCol="0" anchor="ctr"/>
+          <a:lstStyle/>
+          <a:p>
+            <a:pPr algn="ctr"/>
+            <a:endParaRPr lang="en-NL"/>
+          </a:p>
+        </p:txBody>
+      </p:sp>
+    </p:spTree>
+    <p:extLst>
+      <p:ext uri="{BB962C8B-B14F-4D97-AF65-F5344CB8AC3E}">
+        <p14:creationId xmlns:p14="http://schemas.microsoft.com/office/powerpoint/2010/main" val="2647683127"/>
+      </p:ext>
+    </p:extLst>
+  </p:cSld>
+  <p:clrMapOvr>
+    <a:masterClrMapping/>
+  </p:clrMapOvr>
+</p:sld>
+</file>
+
+<file path=ppt/slides/slide13.xml><?xml version="1.0" encoding="utf-8"?>
+<p:sld xmlns:a="http://schemas.openxmlformats.org/drawingml/2006/main" xmlns:r="http://schemas.openxmlformats.org/officeDocument/2006/relationships" xmlns:p="http://schemas.openxmlformats.org/presentationml/2006/main">
+  <p:cSld>
+    <p:spTree>
+      <p:nvGrpSpPr>
+        <p:cNvPr id="1" name=""/>
+        <p:cNvGrpSpPr/>
+        <p:nvPr/>
+      </p:nvGrpSpPr>
+      <p:grpSpPr>
+        <a:xfrm>
+          <a:off x="0" y="0"/>
+          <a:ext cx="0" cy="0"/>
+          <a:chOff x="0" y="0"/>
+          <a:chExt cx="0" cy="0"/>
+        </a:xfrm>
+      </p:grpSpPr>
+      <p:pic>
+        <p:nvPicPr>
+          <p:cNvPr id="4" name="Picture 3" descr="A screenshot of a computer&#10;&#10;Description automatically generated">
+            <a:extLst>
+              <a:ext uri="{FF2B5EF4-FFF2-40B4-BE49-F238E27FC236}">
+                <a16:creationId xmlns:a16="http://schemas.microsoft.com/office/drawing/2014/main" id="{C1A29201-57BD-3AA8-83C8-8C479D225204}"/>
+              </a:ext>
+            </a:extLst>
+          </p:cNvPr>
+          <p:cNvPicPr>
+            <a:picLocks noChangeAspect="1"/>
+          </p:cNvPicPr>
+          <p:nvPr/>
+        </p:nvPicPr>
+        <p:blipFill>
+          <a:blip r:embed="rId2"/>
+          <a:stretch>
+            <a:fillRect/>
+          </a:stretch>
+        </p:blipFill>
+        <p:spPr>
+          <a:xfrm>
+            <a:off x="3869459" y="3193393"/>
+            <a:ext cx="6032500" cy="2476500"/>
+          </a:xfrm>
+          <a:prstGeom prst="rect">
+            <a:avLst/>
+          </a:prstGeom>
+        </p:spPr>
+      </p:pic>
+      <p:sp>
+        <p:nvSpPr>
+          <p:cNvPr id="5" name="Rectangle 4">
+            <a:extLst>
+              <a:ext uri="{FF2B5EF4-FFF2-40B4-BE49-F238E27FC236}">
+                <a16:creationId xmlns:a16="http://schemas.microsoft.com/office/drawing/2014/main" id="{3D7AA4E1-30B9-2883-6779-9A5107FEA656}"/>
+              </a:ext>
+            </a:extLst>
+          </p:cNvPr>
+          <p:cNvSpPr/>
+          <p:nvPr/>
+        </p:nvSpPr>
+        <p:spPr>
+          <a:xfrm>
+            <a:off x="8039820" y="4349857"/>
+            <a:ext cx="1862139" cy="1320036"/>
+          </a:xfrm>
+          <a:prstGeom prst="rect">
+            <a:avLst/>
+          </a:prstGeom>
+          <a:ln>
+            <a:solidFill>
+              <a:schemeClr val="bg1"/>
+            </a:solidFill>
+          </a:ln>
+        </p:spPr>
+        <p:style>
+          <a:lnRef idx="2">
+            <a:schemeClr val="accent6"/>
+          </a:lnRef>
+          <a:fillRef idx="1">
+            <a:schemeClr val="lt1"/>
+          </a:fillRef>
+          <a:effectRef idx="0">
+            <a:schemeClr val="accent6"/>
+          </a:effectRef>
+          <a:fontRef idx="minor">
+            <a:schemeClr val="dk1"/>
+          </a:fontRef>
+        </p:style>
+        <p:txBody>
+          <a:bodyPr rtlCol="0" anchor="ctr"/>
+          <a:lstStyle/>
+          <a:p>
+            <a:pPr algn="ctr"/>
+            <a:endParaRPr lang="en-NL"/>
+          </a:p>
+        </p:txBody>
+      </p:sp>
+    </p:spTree>
+    <p:extLst>
+      <p:ext uri="{BB962C8B-B14F-4D97-AF65-F5344CB8AC3E}">
+        <p14:creationId xmlns:p14="http://schemas.microsoft.com/office/powerpoint/2010/main" val="602925233"/>
+      </p:ext>
+    </p:extLst>
+  </p:cSld>
+  <p:clrMapOvr>
+    <a:masterClrMapping/>
+  </p:clrMapOvr>
+</p:sld>
+</file>
+
 <file path=ppt/slides/slide2.xml><?xml version="1.0" encoding="utf-8"?>
 <p:sld xmlns:a="http://schemas.openxmlformats.org/drawingml/2006/main" xmlns:r="http://schemas.openxmlformats.org/officeDocument/2006/relationships" xmlns:p="http://schemas.openxmlformats.org/presentationml/2006/main">
   <p:cSld>
@@ -3478,6 +4111,2227 @@
     <p:extLst>
       <p:ext uri="{BB962C8B-B14F-4D97-AF65-F5344CB8AC3E}">
         <p14:creationId xmlns:p14="http://schemas.microsoft.com/office/powerpoint/2010/main" val="3426236834"/>
+      </p:ext>
+    </p:extLst>
+  </p:cSld>
+  <p:clrMapOvr>
+    <a:masterClrMapping/>
+  </p:clrMapOvr>
+</p:sld>
+</file>
+
+<file path=ppt/slides/slide3.xml><?xml version="1.0" encoding="utf-8"?>
+<p:sld xmlns:a="http://schemas.openxmlformats.org/drawingml/2006/main" xmlns:r="http://schemas.openxmlformats.org/officeDocument/2006/relationships" xmlns:p="http://schemas.openxmlformats.org/presentationml/2006/main">
+  <p:cSld>
+    <p:bg>
+      <p:bgPr>
+        <a:solidFill>
+          <a:schemeClr val="bg1"/>
+        </a:solidFill>
+        <a:effectLst/>
+      </p:bgPr>
+    </p:bg>
+    <p:spTree>
+      <p:nvGrpSpPr>
+        <p:cNvPr id="1" name=""/>
+        <p:cNvGrpSpPr/>
+        <p:nvPr/>
+      </p:nvGrpSpPr>
+      <p:grpSpPr>
+        <a:xfrm>
+          <a:off x="0" y="0"/>
+          <a:ext cx="0" cy="0"/>
+          <a:chOff x="0" y="0"/>
+          <a:chExt cx="0" cy="0"/>
+        </a:xfrm>
+      </p:grpSpPr>
+      <p:sp useBgFill="1">
+        <p:nvSpPr>
+          <p:cNvPr id="9" name="Rectangle 8">
+            <a:extLst>
+              <a:ext uri="{FF2B5EF4-FFF2-40B4-BE49-F238E27FC236}">
+                <a16:creationId xmlns:a16="http://schemas.microsoft.com/office/drawing/2014/main" id="{DA2E7C1E-2B5A-4BBA-AE51-1CD8C19309D7}"/>
+              </a:ext>
+              <a:ext uri="{C183D7F6-B498-43B3-948B-1728B52AA6E4}">
+                <adec:decorative xmlns:adec="http://schemas.microsoft.com/office/drawing/2017/decorative" val="1"/>
+              </a:ext>
+            </a:extLst>
+          </p:cNvPr>
+          <p:cNvSpPr>
+            <a:spLocks noGrp="1" noRot="1" noChangeAspect="1" noMove="1" noResize="1" noEditPoints="1" noAdjustHandles="1" noChangeArrowheads="1" noChangeShapeType="1" noTextEdit="1"/>
+          </p:cNvSpPr>
+          <p:nvPr>
+            <p:extLst>
+              <p:ext uri="{386F3935-93C4-4BCD-93E2-E3B085C9AB24}">
+                <p16:designElem xmlns:p16="http://schemas.microsoft.com/office/powerpoint/2015/main" val="1"/>
+              </p:ext>
+            </p:extLst>
+          </p:nvPr>
+        </p:nvSpPr>
+        <p:spPr>
+          <a:xfrm>
+            <a:off x="0" y="0"/>
+            <a:ext cx="12188952" cy="6858000"/>
+          </a:xfrm>
+          <a:prstGeom prst="rect">
+            <a:avLst/>
+          </a:prstGeom>
+          <a:ln>
+            <a:noFill/>
+          </a:ln>
+        </p:spPr>
+        <p:style>
+          <a:lnRef idx="2">
+            <a:schemeClr val="accent1">
+              <a:shade val="50000"/>
+            </a:schemeClr>
+          </a:lnRef>
+          <a:fillRef idx="1">
+            <a:schemeClr val="accent1"/>
+          </a:fillRef>
+          <a:effectRef idx="0">
+            <a:schemeClr val="accent1"/>
+          </a:effectRef>
+          <a:fontRef idx="minor">
+            <a:schemeClr val="lt1"/>
+          </a:fontRef>
+        </p:style>
+        <p:txBody>
+          <a:bodyPr rtlCol="0" anchor="ctr"/>
+          <a:lstStyle/>
+          <a:p>
+            <a:pPr algn="ctr"/>
+            <a:endParaRPr lang="en-US"/>
+          </a:p>
+        </p:txBody>
+      </p:sp>
+      <p:sp>
+        <p:nvSpPr>
+          <p:cNvPr id="11" name="Rectangle 6">
+            <a:extLst>
+              <a:ext uri="{FF2B5EF4-FFF2-40B4-BE49-F238E27FC236}">
+                <a16:creationId xmlns:a16="http://schemas.microsoft.com/office/drawing/2014/main" id="{43DF76B1-5174-4FAF-9D19-FFEE98426836}"/>
+              </a:ext>
+              <a:ext uri="{C183D7F6-B498-43B3-948B-1728B52AA6E4}">
+                <adec:decorative xmlns:adec="http://schemas.microsoft.com/office/drawing/2017/decorative" val="1"/>
+              </a:ext>
+            </a:extLst>
+          </p:cNvPr>
+          <p:cNvSpPr>
+            <a:spLocks noGrp="1" noRot="1" noChangeAspect="1" noMove="1" noResize="1" noEditPoints="1" noAdjustHandles="1" noChangeArrowheads="1" noChangeShapeType="1" noTextEdit="1"/>
+          </p:cNvSpPr>
+          <p:nvPr>
+            <p:extLst>
+              <p:ext uri="{386F3935-93C4-4BCD-93E2-E3B085C9AB24}">
+                <p16:designElem xmlns:p16="http://schemas.microsoft.com/office/powerpoint/2015/main" val="1"/>
+              </p:ext>
+            </p:extLst>
+          </p:nvPr>
+        </p:nvSpPr>
+        <p:spPr>
+          <a:xfrm flipV="1">
+            <a:off x="838200" y="720953"/>
+            <a:ext cx="10515600" cy="5416094"/>
+          </a:xfrm>
+          <a:custGeom>
+            <a:avLst/>
+            <a:gdLst>
+              <a:gd name="connsiteX0" fmla="*/ 0 w 10515600"/>
+              <a:gd name="connsiteY0" fmla="*/ 0 h 5416094"/>
+              <a:gd name="connsiteX1" fmla="*/ 552069 w 10515600"/>
+              <a:gd name="connsiteY1" fmla="*/ 0 h 5416094"/>
+              <a:gd name="connsiteX2" fmla="*/ 893826 w 10515600"/>
+              <a:gd name="connsiteY2" fmla="*/ 0 h 5416094"/>
+              <a:gd name="connsiteX3" fmla="*/ 1761363 w 10515600"/>
+              <a:gd name="connsiteY3" fmla="*/ 0 h 5416094"/>
+              <a:gd name="connsiteX4" fmla="*/ 2313432 w 10515600"/>
+              <a:gd name="connsiteY4" fmla="*/ 0 h 5416094"/>
+              <a:gd name="connsiteX5" fmla="*/ 2865501 w 10515600"/>
+              <a:gd name="connsiteY5" fmla="*/ 0 h 5416094"/>
+              <a:gd name="connsiteX6" fmla="*/ 3733038 w 10515600"/>
+              <a:gd name="connsiteY6" fmla="*/ 0 h 5416094"/>
+              <a:gd name="connsiteX7" fmla="*/ 4179951 w 10515600"/>
+              <a:gd name="connsiteY7" fmla="*/ 0 h 5416094"/>
+              <a:gd name="connsiteX8" fmla="*/ 5047488 w 10515600"/>
+              <a:gd name="connsiteY8" fmla="*/ 0 h 5416094"/>
+              <a:gd name="connsiteX9" fmla="*/ 5915025 w 10515600"/>
+              <a:gd name="connsiteY9" fmla="*/ 0 h 5416094"/>
+              <a:gd name="connsiteX10" fmla="*/ 6572250 w 10515600"/>
+              <a:gd name="connsiteY10" fmla="*/ 0 h 5416094"/>
+              <a:gd name="connsiteX11" fmla="*/ 7439787 w 10515600"/>
+              <a:gd name="connsiteY11" fmla="*/ 0 h 5416094"/>
+              <a:gd name="connsiteX12" fmla="*/ 7991856 w 10515600"/>
+              <a:gd name="connsiteY12" fmla="*/ 0 h 5416094"/>
+              <a:gd name="connsiteX13" fmla="*/ 8543925 w 10515600"/>
+              <a:gd name="connsiteY13" fmla="*/ 0 h 5416094"/>
+              <a:gd name="connsiteX14" fmla="*/ 9306306 w 10515600"/>
+              <a:gd name="connsiteY14" fmla="*/ 0 h 5416094"/>
+              <a:gd name="connsiteX15" fmla="*/ 9858375 w 10515600"/>
+              <a:gd name="connsiteY15" fmla="*/ 0 h 5416094"/>
+              <a:gd name="connsiteX16" fmla="*/ 10515600 w 10515600"/>
+              <a:gd name="connsiteY16" fmla="*/ 0 h 5416094"/>
+              <a:gd name="connsiteX17" fmla="*/ 10515600 w 10515600"/>
+              <a:gd name="connsiteY17" fmla="*/ 785334 h 5416094"/>
+              <a:gd name="connsiteX18" fmla="*/ 10515600 w 10515600"/>
+              <a:gd name="connsiteY18" fmla="*/ 1516506 h 5416094"/>
+              <a:gd name="connsiteX19" fmla="*/ 10515600 w 10515600"/>
+              <a:gd name="connsiteY19" fmla="*/ 2247679 h 5416094"/>
+              <a:gd name="connsiteX20" fmla="*/ 10515600 w 10515600"/>
+              <a:gd name="connsiteY20" fmla="*/ 2762208 h 5416094"/>
+              <a:gd name="connsiteX21" fmla="*/ 10515600 w 10515600"/>
+              <a:gd name="connsiteY21" fmla="*/ 3330898 h 5416094"/>
+              <a:gd name="connsiteX22" fmla="*/ 10515600 w 10515600"/>
+              <a:gd name="connsiteY22" fmla="*/ 4062071 h 5416094"/>
+              <a:gd name="connsiteX23" fmla="*/ 10515600 w 10515600"/>
+              <a:gd name="connsiteY23" fmla="*/ 4684921 h 5416094"/>
+              <a:gd name="connsiteX24" fmla="*/ 10515600 w 10515600"/>
+              <a:gd name="connsiteY24" fmla="*/ 5416094 h 5416094"/>
+              <a:gd name="connsiteX25" fmla="*/ 9753219 w 10515600"/>
+              <a:gd name="connsiteY25" fmla="*/ 5416094 h 5416094"/>
+              <a:gd name="connsiteX26" fmla="*/ 9411462 w 10515600"/>
+              <a:gd name="connsiteY26" fmla="*/ 5416094 h 5416094"/>
+              <a:gd name="connsiteX27" fmla="*/ 8754237 w 10515600"/>
+              <a:gd name="connsiteY27" fmla="*/ 5416094 h 5416094"/>
+              <a:gd name="connsiteX28" fmla="*/ 8307324 w 10515600"/>
+              <a:gd name="connsiteY28" fmla="*/ 5416094 h 5416094"/>
+              <a:gd name="connsiteX29" fmla="*/ 7544943 w 10515600"/>
+              <a:gd name="connsiteY29" fmla="*/ 5416094 h 5416094"/>
+              <a:gd name="connsiteX30" fmla="*/ 7098030 w 10515600"/>
+              <a:gd name="connsiteY30" fmla="*/ 5416094 h 5416094"/>
+              <a:gd name="connsiteX31" fmla="*/ 6335649 w 10515600"/>
+              <a:gd name="connsiteY31" fmla="*/ 5416094 h 5416094"/>
+              <a:gd name="connsiteX32" fmla="*/ 5993892 w 10515600"/>
+              <a:gd name="connsiteY32" fmla="*/ 5416094 h 5416094"/>
+              <a:gd name="connsiteX33" fmla="*/ 5231511 w 10515600"/>
+              <a:gd name="connsiteY33" fmla="*/ 5416094 h 5416094"/>
+              <a:gd name="connsiteX34" fmla="*/ 4784598 w 10515600"/>
+              <a:gd name="connsiteY34" fmla="*/ 5416094 h 5416094"/>
+              <a:gd name="connsiteX35" fmla="*/ 4442841 w 10515600"/>
+              <a:gd name="connsiteY35" fmla="*/ 5416094 h 5416094"/>
+              <a:gd name="connsiteX36" fmla="*/ 3995928 w 10515600"/>
+              <a:gd name="connsiteY36" fmla="*/ 5416094 h 5416094"/>
+              <a:gd name="connsiteX37" fmla="*/ 3233547 w 10515600"/>
+              <a:gd name="connsiteY37" fmla="*/ 5416094 h 5416094"/>
+              <a:gd name="connsiteX38" fmla="*/ 2786634 w 10515600"/>
+              <a:gd name="connsiteY38" fmla="*/ 5416094 h 5416094"/>
+              <a:gd name="connsiteX39" fmla="*/ 2444877 w 10515600"/>
+              <a:gd name="connsiteY39" fmla="*/ 5416094 h 5416094"/>
+              <a:gd name="connsiteX40" fmla="*/ 1997964 w 10515600"/>
+              <a:gd name="connsiteY40" fmla="*/ 5416094 h 5416094"/>
+              <a:gd name="connsiteX41" fmla="*/ 1445895 w 10515600"/>
+              <a:gd name="connsiteY41" fmla="*/ 5416094 h 5416094"/>
+              <a:gd name="connsiteX42" fmla="*/ 788670 w 10515600"/>
+              <a:gd name="connsiteY42" fmla="*/ 5416094 h 5416094"/>
+              <a:gd name="connsiteX43" fmla="*/ 0 w 10515600"/>
+              <a:gd name="connsiteY43" fmla="*/ 5416094 h 5416094"/>
+              <a:gd name="connsiteX44" fmla="*/ 0 w 10515600"/>
+              <a:gd name="connsiteY44" fmla="*/ 4630760 h 5416094"/>
+              <a:gd name="connsiteX45" fmla="*/ 0 w 10515600"/>
+              <a:gd name="connsiteY45" fmla="*/ 3953749 h 5416094"/>
+              <a:gd name="connsiteX46" fmla="*/ 0 w 10515600"/>
+              <a:gd name="connsiteY46" fmla="*/ 3276737 h 5416094"/>
+              <a:gd name="connsiteX47" fmla="*/ 0 w 10515600"/>
+              <a:gd name="connsiteY47" fmla="*/ 2599725 h 5416094"/>
+              <a:gd name="connsiteX48" fmla="*/ 0 w 10515600"/>
+              <a:gd name="connsiteY48" fmla="*/ 1922713 h 5416094"/>
+              <a:gd name="connsiteX49" fmla="*/ 0 w 10515600"/>
+              <a:gd name="connsiteY49" fmla="*/ 1299863 h 5416094"/>
+              <a:gd name="connsiteX50" fmla="*/ 0 w 10515600"/>
+              <a:gd name="connsiteY50" fmla="*/ 0 h 5416094"/>
+            </a:gdLst>
+            <a:ahLst/>
+            <a:cxnLst>
+              <a:cxn ang="0">
+                <a:pos x="connsiteX0" y="connsiteY0"/>
+              </a:cxn>
+              <a:cxn ang="0">
+                <a:pos x="connsiteX1" y="connsiteY1"/>
+              </a:cxn>
+              <a:cxn ang="0">
+                <a:pos x="connsiteX2" y="connsiteY2"/>
+              </a:cxn>
+              <a:cxn ang="0">
+                <a:pos x="connsiteX3" y="connsiteY3"/>
+              </a:cxn>
+              <a:cxn ang="0">
+                <a:pos x="connsiteX4" y="connsiteY4"/>
+              </a:cxn>
+              <a:cxn ang="0">
+                <a:pos x="connsiteX5" y="connsiteY5"/>
+              </a:cxn>
+              <a:cxn ang="0">
+                <a:pos x="connsiteX6" y="connsiteY6"/>
+              </a:cxn>
+              <a:cxn ang="0">
+                <a:pos x="connsiteX7" y="connsiteY7"/>
+              </a:cxn>
+              <a:cxn ang="0">
+                <a:pos x="connsiteX8" y="connsiteY8"/>
+              </a:cxn>
+              <a:cxn ang="0">
+                <a:pos x="connsiteX9" y="connsiteY9"/>
+              </a:cxn>
+              <a:cxn ang="0">
+                <a:pos x="connsiteX10" y="connsiteY10"/>
+              </a:cxn>
+              <a:cxn ang="0">
+                <a:pos x="connsiteX11" y="connsiteY11"/>
+              </a:cxn>
+              <a:cxn ang="0">
+                <a:pos x="connsiteX12" y="connsiteY12"/>
+              </a:cxn>
+              <a:cxn ang="0">
+                <a:pos x="connsiteX13" y="connsiteY13"/>
+              </a:cxn>
+              <a:cxn ang="0">
+                <a:pos x="connsiteX14" y="connsiteY14"/>
+              </a:cxn>
+              <a:cxn ang="0">
+                <a:pos x="connsiteX15" y="connsiteY15"/>
+              </a:cxn>
+              <a:cxn ang="0">
+                <a:pos x="connsiteX16" y="connsiteY16"/>
+              </a:cxn>
+              <a:cxn ang="0">
+                <a:pos x="connsiteX17" y="connsiteY17"/>
+              </a:cxn>
+              <a:cxn ang="0">
+                <a:pos x="connsiteX18" y="connsiteY18"/>
+              </a:cxn>
+              <a:cxn ang="0">
+                <a:pos x="connsiteX19" y="connsiteY19"/>
+              </a:cxn>
+              <a:cxn ang="0">
+                <a:pos x="connsiteX20" y="connsiteY20"/>
+              </a:cxn>
+              <a:cxn ang="0">
+                <a:pos x="connsiteX21" y="connsiteY21"/>
+              </a:cxn>
+              <a:cxn ang="0">
+                <a:pos x="connsiteX22" y="connsiteY22"/>
+              </a:cxn>
+              <a:cxn ang="0">
+                <a:pos x="connsiteX23" y="connsiteY23"/>
+              </a:cxn>
+              <a:cxn ang="0">
+                <a:pos x="connsiteX24" y="connsiteY24"/>
+              </a:cxn>
+              <a:cxn ang="0">
+                <a:pos x="connsiteX25" y="connsiteY25"/>
+              </a:cxn>
+              <a:cxn ang="0">
+                <a:pos x="connsiteX26" y="connsiteY26"/>
+              </a:cxn>
+              <a:cxn ang="0">
+                <a:pos x="connsiteX27" y="connsiteY27"/>
+              </a:cxn>
+              <a:cxn ang="0">
+                <a:pos x="connsiteX28" y="connsiteY28"/>
+              </a:cxn>
+              <a:cxn ang="0">
+                <a:pos x="connsiteX29" y="connsiteY29"/>
+              </a:cxn>
+              <a:cxn ang="0">
+                <a:pos x="connsiteX30" y="connsiteY30"/>
+              </a:cxn>
+              <a:cxn ang="0">
+                <a:pos x="connsiteX31" y="connsiteY31"/>
+              </a:cxn>
+              <a:cxn ang="0">
+                <a:pos x="connsiteX32" y="connsiteY32"/>
+              </a:cxn>
+              <a:cxn ang="0">
+                <a:pos x="connsiteX33" y="connsiteY33"/>
+              </a:cxn>
+              <a:cxn ang="0">
+                <a:pos x="connsiteX34" y="connsiteY34"/>
+              </a:cxn>
+              <a:cxn ang="0">
+                <a:pos x="connsiteX35" y="connsiteY35"/>
+              </a:cxn>
+              <a:cxn ang="0">
+                <a:pos x="connsiteX36" y="connsiteY36"/>
+              </a:cxn>
+              <a:cxn ang="0">
+                <a:pos x="connsiteX37" y="connsiteY37"/>
+              </a:cxn>
+              <a:cxn ang="0">
+                <a:pos x="connsiteX38" y="connsiteY38"/>
+              </a:cxn>
+              <a:cxn ang="0">
+                <a:pos x="connsiteX39" y="connsiteY39"/>
+              </a:cxn>
+              <a:cxn ang="0">
+                <a:pos x="connsiteX40" y="connsiteY40"/>
+              </a:cxn>
+              <a:cxn ang="0">
+                <a:pos x="connsiteX41" y="connsiteY41"/>
+              </a:cxn>
+              <a:cxn ang="0">
+                <a:pos x="connsiteX42" y="connsiteY42"/>
+              </a:cxn>
+              <a:cxn ang="0">
+                <a:pos x="connsiteX43" y="connsiteY43"/>
+              </a:cxn>
+              <a:cxn ang="0">
+                <a:pos x="connsiteX44" y="connsiteY44"/>
+              </a:cxn>
+              <a:cxn ang="0">
+                <a:pos x="connsiteX45" y="connsiteY45"/>
+              </a:cxn>
+              <a:cxn ang="0">
+                <a:pos x="connsiteX46" y="connsiteY46"/>
+              </a:cxn>
+              <a:cxn ang="0">
+                <a:pos x="connsiteX47" y="connsiteY47"/>
+              </a:cxn>
+              <a:cxn ang="0">
+                <a:pos x="connsiteX48" y="connsiteY48"/>
+              </a:cxn>
+              <a:cxn ang="0">
+                <a:pos x="connsiteX49" y="connsiteY49"/>
+              </a:cxn>
+              <a:cxn ang="0">
+                <a:pos x="connsiteX50" y="connsiteY50"/>
+              </a:cxn>
+            </a:cxnLst>
+            <a:rect l="l" t="t" r="r" b="b"/>
+            <a:pathLst>
+              <a:path w="10515600" h="5416094" extrusionOk="0">
+                <a:moveTo>
+                  <a:pt x="0" y="0"/>
+                </a:moveTo>
+                <a:cubicBezTo>
+                  <a:pt x="230793" y="14353"/>
+                  <a:pt x="332416" y="21392"/>
+                  <a:pt x="552069" y="0"/>
+                </a:cubicBezTo>
+                <a:cubicBezTo>
+                  <a:pt x="771722" y="-21392"/>
+                  <a:pt x="761737" y="-14337"/>
+                  <a:pt x="893826" y="0"/>
+                </a:cubicBezTo>
+                <a:cubicBezTo>
+                  <a:pt x="1025915" y="14337"/>
+                  <a:pt x="1441584" y="-15498"/>
+                  <a:pt x="1761363" y="0"/>
+                </a:cubicBezTo>
+                <a:cubicBezTo>
+                  <a:pt x="2081142" y="15498"/>
+                  <a:pt x="2111503" y="7278"/>
+                  <a:pt x="2313432" y="0"/>
+                </a:cubicBezTo>
+                <a:cubicBezTo>
+                  <a:pt x="2515361" y="-7278"/>
+                  <a:pt x="2743584" y="-17845"/>
+                  <a:pt x="2865501" y="0"/>
+                </a:cubicBezTo>
+                <a:cubicBezTo>
+                  <a:pt x="2987418" y="17845"/>
+                  <a:pt x="3345183" y="8208"/>
+                  <a:pt x="3733038" y="0"/>
+                </a:cubicBezTo>
+                <a:cubicBezTo>
+                  <a:pt x="4120893" y="-8208"/>
+                  <a:pt x="4009066" y="-3159"/>
+                  <a:pt x="4179951" y="0"/>
+                </a:cubicBezTo>
+                <a:cubicBezTo>
+                  <a:pt x="4350836" y="3159"/>
+                  <a:pt x="4735020" y="17517"/>
+                  <a:pt x="5047488" y="0"/>
+                </a:cubicBezTo>
+                <a:cubicBezTo>
+                  <a:pt x="5359956" y="-17517"/>
+                  <a:pt x="5662148" y="-17777"/>
+                  <a:pt x="5915025" y="0"/>
+                </a:cubicBezTo>
+                <a:cubicBezTo>
+                  <a:pt x="6167902" y="17777"/>
+                  <a:pt x="6308797" y="30350"/>
+                  <a:pt x="6572250" y="0"/>
+                </a:cubicBezTo>
+                <a:cubicBezTo>
+                  <a:pt x="6835703" y="-30350"/>
+                  <a:pt x="7107419" y="-9627"/>
+                  <a:pt x="7439787" y="0"/>
+                </a:cubicBezTo>
+                <a:cubicBezTo>
+                  <a:pt x="7772155" y="9627"/>
+                  <a:pt x="7844034" y="-9098"/>
+                  <a:pt x="7991856" y="0"/>
+                </a:cubicBezTo>
+                <a:cubicBezTo>
+                  <a:pt x="8139678" y="9098"/>
+                  <a:pt x="8289889" y="-20239"/>
+                  <a:pt x="8543925" y="0"/>
+                </a:cubicBezTo>
+                <a:cubicBezTo>
+                  <a:pt x="8797961" y="20239"/>
+                  <a:pt x="8994198" y="29575"/>
+                  <a:pt x="9306306" y="0"/>
+                </a:cubicBezTo>
+                <a:cubicBezTo>
+                  <a:pt x="9618414" y="-29575"/>
+                  <a:pt x="9739118" y="-23835"/>
+                  <a:pt x="9858375" y="0"/>
+                </a:cubicBezTo>
+                <a:cubicBezTo>
+                  <a:pt x="9977632" y="23835"/>
+                  <a:pt x="10370488" y="-4069"/>
+                  <a:pt x="10515600" y="0"/>
+                </a:cubicBezTo>
+                <a:cubicBezTo>
+                  <a:pt x="10524919" y="196329"/>
+                  <a:pt x="10549062" y="488432"/>
+                  <a:pt x="10515600" y="785334"/>
+                </a:cubicBezTo>
+                <a:cubicBezTo>
+                  <a:pt x="10482138" y="1082236"/>
+                  <a:pt x="10536385" y="1323726"/>
+                  <a:pt x="10515600" y="1516506"/>
+                </a:cubicBezTo>
+                <a:cubicBezTo>
+                  <a:pt x="10494815" y="1709286"/>
+                  <a:pt x="10546328" y="2097632"/>
+                  <a:pt x="10515600" y="2247679"/>
+                </a:cubicBezTo>
+                <a:cubicBezTo>
+                  <a:pt x="10484872" y="2397726"/>
+                  <a:pt x="10491771" y="2577292"/>
+                  <a:pt x="10515600" y="2762208"/>
+                </a:cubicBezTo>
+                <a:cubicBezTo>
+                  <a:pt x="10539429" y="2947124"/>
+                  <a:pt x="10511007" y="3105736"/>
+                  <a:pt x="10515600" y="3330898"/>
+                </a:cubicBezTo>
+                <a:cubicBezTo>
+                  <a:pt x="10520194" y="3556060"/>
+                  <a:pt x="10497393" y="3882611"/>
+                  <a:pt x="10515600" y="4062071"/>
+                </a:cubicBezTo>
+                <a:cubicBezTo>
+                  <a:pt x="10533807" y="4241531"/>
+                  <a:pt x="10544791" y="4505155"/>
+                  <a:pt x="10515600" y="4684921"/>
+                </a:cubicBezTo>
+                <a:cubicBezTo>
+                  <a:pt x="10486410" y="4864687"/>
+                  <a:pt x="10497356" y="5246484"/>
+                  <a:pt x="10515600" y="5416094"/>
+                </a:cubicBezTo>
+                <a:cubicBezTo>
+                  <a:pt x="10245623" y="5445692"/>
+                  <a:pt x="10029676" y="5415505"/>
+                  <a:pt x="9753219" y="5416094"/>
+                </a:cubicBezTo>
+                <a:cubicBezTo>
+                  <a:pt x="9476762" y="5416683"/>
+                  <a:pt x="9553148" y="5422760"/>
+                  <a:pt x="9411462" y="5416094"/>
+                </a:cubicBezTo>
+                <a:cubicBezTo>
+                  <a:pt x="9269776" y="5409428"/>
+                  <a:pt x="8927709" y="5385012"/>
+                  <a:pt x="8754237" y="5416094"/>
+                </a:cubicBezTo>
+                <a:cubicBezTo>
+                  <a:pt x="8580766" y="5447176"/>
+                  <a:pt x="8413264" y="5410024"/>
+                  <a:pt x="8307324" y="5416094"/>
+                </a:cubicBezTo>
+                <a:cubicBezTo>
+                  <a:pt x="8201384" y="5422164"/>
+                  <a:pt x="7912690" y="5421686"/>
+                  <a:pt x="7544943" y="5416094"/>
+                </a:cubicBezTo>
+                <a:cubicBezTo>
+                  <a:pt x="7177196" y="5410502"/>
+                  <a:pt x="7304235" y="5418502"/>
+                  <a:pt x="7098030" y="5416094"/>
+                </a:cubicBezTo>
+                <a:cubicBezTo>
+                  <a:pt x="6891825" y="5413686"/>
+                  <a:pt x="6541479" y="5434609"/>
+                  <a:pt x="6335649" y="5416094"/>
+                </a:cubicBezTo>
+                <a:cubicBezTo>
+                  <a:pt x="6129819" y="5397579"/>
+                  <a:pt x="6106541" y="5402791"/>
+                  <a:pt x="5993892" y="5416094"/>
+                </a:cubicBezTo>
+                <a:cubicBezTo>
+                  <a:pt x="5881243" y="5429397"/>
+                  <a:pt x="5545248" y="5437743"/>
+                  <a:pt x="5231511" y="5416094"/>
+                </a:cubicBezTo>
+                <a:cubicBezTo>
+                  <a:pt x="4917774" y="5394445"/>
+                  <a:pt x="4963237" y="5426599"/>
+                  <a:pt x="4784598" y="5416094"/>
+                </a:cubicBezTo>
+                <a:cubicBezTo>
+                  <a:pt x="4605959" y="5405589"/>
+                  <a:pt x="4605904" y="5406658"/>
+                  <a:pt x="4442841" y="5416094"/>
+                </a:cubicBezTo>
+                <a:cubicBezTo>
+                  <a:pt x="4279778" y="5425530"/>
+                  <a:pt x="4177180" y="5426138"/>
+                  <a:pt x="3995928" y="5416094"/>
+                </a:cubicBezTo>
+                <a:cubicBezTo>
+                  <a:pt x="3814676" y="5406050"/>
+                  <a:pt x="3516440" y="5429234"/>
+                  <a:pt x="3233547" y="5416094"/>
+                </a:cubicBezTo>
+                <a:cubicBezTo>
+                  <a:pt x="2950654" y="5402954"/>
+                  <a:pt x="2884354" y="5436103"/>
+                  <a:pt x="2786634" y="5416094"/>
+                </a:cubicBezTo>
+                <a:cubicBezTo>
+                  <a:pt x="2688914" y="5396085"/>
+                  <a:pt x="2522958" y="5423232"/>
+                  <a:pt x="2444877" y="5416094"/>
+                </a:cubicBezTo>
+                <a:cubicBezTo>
+                  <a:pt x="2366796" y="5408956"/>
+                  <a:pt x="2104768" y="5395479"/>
+                  <a:pt x="1997964" y="5416094"/>
+                </a:cubicBezTo>
+                <a:cubicBezTo>
+                  <a:pt x="1891160" y="5436709"/>
+                  <a:pt x="1573016" y="5412376"/>
+                  <a:pt x="1445895" y="5416094"/>
+                </a:cubicBezTo>
+                <a:cubicBezTo>
+                  <a:pt x="1318774" y="5419812"/>
+                  <a:pt x="986443" y="5400529"/>
+                  <a:pt x="788670" y="5416094"/>
+                </a:cubicBezTo>
+                <a:cubicBezTo>
+                  <a:pt x="590897" y="5431659"/>
+                  <a:pt x="363709" y="5381266"/>
+                  <a:pt x="0" y="5416094"/>
+                </a:cubicBezTo>
+                <a:cubicBezTo>
+                  <a:pt x="-22973" y="5218643"/>
+                  <a:pt x="-26699" y="5010779"/>
+                  <a:pt x="0" y="4630760"/>
+                </a:cubicBezTo>
+                <a:cubicBezTo>
+                  <a:pt x="26699" y="4250741"/>
+                  <a:pt x="-15389" y="4196664"/>
+                  <a:pt x="0" y="3953749"/>
+                </a:cubicBezTo>
+                <a:cubicBezTo>
+                  <a:pt x="15389" y="3710834"/>
+                  <a:pt x="468" y="3611311"/>
+                  <a:pt x="0" y="3276737"/>
+                </a:cubicBezTo>
+                <a:cubicBezTo>
+                  <a:pt x="-468" y="2942163"/>
+                  <a:pt x="15360" y="2781998"/>
+                  <a:pt x="0" y="2599725"/>
+                </a:cubicBezTo>
+                <a:cubicBezTo>
+                  <a:pt x="-15360" y="2417452"/>
+                  <a:pt x="14816" y="2100232"/>
+                  <a:pt x="0" y="1922713"/>
+                </a:cubicBezTo>
+                <a:cubicBezTo>
+                  <a:pt x="-14816" y="1745194"/>
+                  <a:pt x="-24648" y="1604167"/>
+                  <a:pt x="0" y="1299863"/>
+                </a:cubicBezTo>
+                <a:cubicBezTo>
+                  <a:pt x="24648" y="995559"/>
+                  <a:pt x="2182" y="279525"/>
+                  <a:pt x="0" y="0"/>
+                </a:cubicBezTo>
+                <a:close/>
+              </a:path>
+            </a:pathLst>
+          </a:custGeom>
+          <a:noFill/>
+          <a:ln w="47625" cap="rnd">
+            <a:solidFill>
+              <a:schemeClr val="accent2"/>
+            </a:solidFill>
+            <a:round/>
+            <a:extLst>
+              <a:ext uri="{C807C97D-BFC1-408E-A445-0C87EB9F89A2}">
+                <ask:lineSketchStyleProps xmlns:ask="http://schemas.microsoft.com/office/drawing/2018/sketchyshapes" sd="1219033472">
+                  <a:prstGeom prst="rect">
+                    <a:avLst/>
+                  </a:prstGeom>
+                  <ask:type>
+                    <ask:lineSketchFreehand/>
+                  </ask:type>
+                </ask:lineSketchStyleProps>
+              </a:ext>
+            </a:extLst>
+          </a:ln>
+        </p:spPr>
+        <p:style>
+          <a:lnRef idx="2">
+            <a:schemeClr val="accent1">
+              <a:shade val="50000"/>
+            </a:schemeClr>
+          </a:lnRef>
+          <a:fillRef idx="1">
+            <a:schemeClr val="accent1"/>
+          </a:fillRef>
+          <a:effectRef idx="0">
+            <a:schemeClr val="accent1"/>
+          </a:effectRef>
+          <a:fontRef idx="minor">
+            <a:schemeClr val="lt1"/>
+          </a:fontRef>
+        </p:style>
+        <p:txBody>
+          <a:bodyPr rtlCol="0" anchor="ctr"/>
+          <a:lstStyle/>
+          <a:p>
+            <a:pPr algn="ctr"/>
+            <a:endParaRPr lang="en-US"/>
+          </a:p>
+        </p:txBody>
+      </p:sp>
+      <p:pic>
+        <p:nvPicPr>
+          <p:cNvPr id="4" name="Picture 3" descr="A screenshot of a computer&#10;&#10;Description automatically generated">
+            <a:extLst>
+              <a:ext uri="{FF2B5EF4-FFF2-40B4-BE49-F238E27FC236}">
+                <a16:creationId xmlns:a16="http://schemas.microsoft.com/office/drawing/2014/main" id="{778730FE-3EE9-371F-CE1A-D5C5BAC7D551}"/>
+              </a:ext>
+            </a:extLst>
+          </p:cNvPr>
+          <p:cNvPicPr>
+            <a:picLocks noChangeAspect="1"/>
+          </p:cNvPicPr>
+          <p:nvPr/>
+        </p:nvPicPr>
+        <p:blipFill>
+          <a:blip r:embed="rId2"/>
+          <a:stretch>
+            <a:fillRect/>
+          </a:stretch>
+        </p:blipFill>
+        <p:spPr>
+          <a:xfrm>
+            <a:off x="990600" y="2017970"/>
+            <a:ext cx="10134600" cy="2761678"/>
+          </a:xfrm>
+          <a:prstGeom prst="rect">
+            <a:avLst/>
+          </a:prstGeom>
+        </p:spPr>
+      </p:pic>
+      <p:sp>
+        <p:nvSpPr>
+          <p:cNvPr id="5" name="Rectangle 4">
+            <a:extLst>
+              <a:ext uri="{FF2B5EF4-FFF2-40B4-BE49-F238E27FC236}">
+                <a16:creationId xmlns:a16="http://schemas.microsoft.com/office/drawing/2014/main" id="{48844527-EA3B-0A85-87A1-F3FB09CCC7BD}"/>
+              </a:ext>
+            </a:extLst>
+          </p:cNvPr>
+          <p:cNvSpPr/>
+          <p:nvPr/>
+        </p:nvSpPr>
+        <p:spPr>
+          <a:xfrm>
+            <a:off x="8229600" y="3986213"/>
+            <a:ext cx="2657475" cy="457200"/>
+          </a:xfrm>
+          <a:prstGeom prst="rect">
+            <a:avLst/>
+          </a:prstGeom>
+          <a:ln>
+            <a:solidFill>
+              <a:schemeClr val="bg1"/>
+            </a:solidFill>
+          </a:ln>
+        </p:spPr>
+        <p:style>
+          <a:lnRef idx="2">
+            <a:schemeClr val="accent6"/>
+          </a:lnRef>
+          <a:fillRef idx="1">
+            <a:schemeClr val="lt1"/>
+          </a:fillRef>
+          <a:effectRef idx="0">
+            <a:schemeClr val="accent6"/>
+          </a:effectRef>
+          <a:fontRef idx="minor">
+            <a:schemeClr val="dk1"/>
+          </a:fontRef>
+        </p:style>
+        <p:txBody>
+          <a:bodyPr rtlCol="0" anchor="ctr"/>
+          <a:lstStyle/>
+          <a:p>
+            <a:pPr algn="ctr"/>
+            <a:endParaRPr lang="en-NL"/>
+          </a:p>
+        </p:txBody>
+      </p:sp>
+      <p:cxnSp>
+        <p:nvCxnSpPr>
+          <p:cNvPr id="7" name="Straight Arrow Connector 6">
+            <a:extLst>
+              <a:ext uri="{FF2B5EF4-FFF2-40B4-BE49-F238E27FC236}">
+                <a16:creationId xmlns:a16="http://schemas.microsoft.com/office/drawing/2014/main" id="{9E72730A-F828-F4C8-7FC8-05BE82C91F3C}"/>
+              </a:ext>
+            </a:extLst>
+          </p:cNvPr>
+          <p:cNvCxnSpPr>
+            <a:cxnSpLocks/>
+          </p:cNvCxnSpPr>
+          <p:nvPr/>
+        </p:nvCxnSpPr>
+        <p:spPr>
+          <a:xfrm flipH="1" flipV="1">
+            <a:off x="2671762" y="3163065"/>
+            <a:ext cx="585787" cy="471487"/>
+          </a:xfrm>
+          <a:prstGeom prst="straightConnector1">
+            <a:avLst/>
+          </a:prstGeom>
+          <a:ln w="50800">
+            <a:tailEnd type="triangle"/>
+          </a:ln>
+        </p:spPr>
+        <p:style>
+          <a:lnRef idx="3">
+            <a:schemeClr val="accent5"/>
+          </a:lnRef>
+          <a:fillRef idx="0">
+            <a:schemeClr val="accent5"/>
+          </a:fillRef>
+          <a:effectRef idx="2">
+            <a:schemeClr val="accent5"/>
+          </a:effectRef>
+          <a:fontRef idx="minor">
+            <a:schemeClr val="tx1"/>
+          </a:fontRef>
+        </p:style>
+      </p:cxnSp>
+      <p:sp>
+        <p:nvSpPr>
+          <p:cNvPr id="10" name="Rectangle 9">
+            <a:extLst>
+              <a:ext uri="{FF2B5EF4-FFF2-40B4-BE49-F238E27FC236}">
+                <a16:creationId xmlns:a16="http://schemas.microsoft.com/office/drawing/2014/main" id="{B8DFBF29-CF3F-7ED8-7FA8-909CCC8D2F41}"/>
+              </a:ext>
+            </a:extLst>
+          </p:cNvPr>
+          <p:cNvSpPr/>
+          <p:nvPr/>
+        </p:nvSpPr>
+        <p:spPr>
+          <a:xfrm>
+            <a:off x="1100138" y="2457450"/>
+            <a:ext cx="1685925" cy="557213"/>
+          </a:xfrm>
+          <a:prstGeom prst="rect">
+            <a:avLst/>
+          </a:prstGeom>
+          <a:noFill/>
+          <a:ln w="57150">
+            <a:solidFill>
+              <a:srgbClr val="7030A0"/>
+            </a:solidFill>
+          </a:ln>
+        </p:spPr>
+        <p:style>
+          <a:lnRef idx="2">
+            <a:schemeClr val="accent1">
+              <a:shade val="15000"/>
+            </a:schemeClr>
+          </a:lnRef>
+          <a:fillRef idx="1">
+            <a:schemeClr val="accent1"/>
+          </a:fillRef>
+          <a:effectRef idx="0">
+            <a:schemeClr val="accent1"/>
+          </a:effectRef>
+          <a:fontRef idx="minor">
+            <a:schemeClr val="lt1"/>
+          </a:fontRef>
+        </p:style>
+        <p:txBody>
+          <a:bodyPr rtlCol="0" anchor="ctr"/>
+          <a:lstStyle/>
+          <a:p>
+            <a:pPr algn="ctr"/>
+            <a:endParaRPr lang="en-NL"/>
+          </a:p>
+        </p:txBody>
+      </p:sp>
+    </p:spTree>
+    <p:extLst>
+      <p:ext uri="{BB962C8B-B14F-4D97-AF65-F5344CB8AC3E}">
+        <p14:creationId xmlns:p14="http://schemas.microsoft.com/office/powerpoint/2010/main" val="1360199387"/>
+      </p:ext>
+    </p:extLst>
+  </p:cSld>
+  <p:clrMapOvr>
+    <a:masterClrMapping/>
+  </p:clrMapOvr>
+</p:sld>
+</file>
+
+<file path=ppt/slides/slide4.xml><?xml version="1.0" encoding="utf-8"?>
+<p:sld xmlns:a="http://schemas.openxmlformats.org/drawingml/2006/main" xmlns:r="http://schemas.openxmlformats.org/officeDocument/2006/relationships" xmlns:p="http://schemas.openxmlformats.org/presentationml/2006/main">
+  <p:cSld>
+    <p:spTree>
+      <p:nvGrpSpPr>
+        <p:cNvPr id="1" name=""/>
+        <p:cNvGrpSpPr/>
+        <p:nvPr/>
+      </p:nvGrpSpPr>
+      <p:grpSpPr>
+        <a:xfrm>
+          <a:off x="0" y="0"/>
+          <a:ext cx="0" cy="0"/>
+          <a:chOff x="0" y="0"/>
+          <a:chExt cx="0" cy="0"/>
+        </a:xfrm>
+      </p:grpSpPr>
+      <p:pic>
+        <p:nvPicPr>
+          <p:cNvPr id="4" name="Picture 3" descr="A screenshot of a computer&#10;&#10;Description automatically generated">
+            <a:extLst>
+              <a:ext uri="{FF2B5EF4-FFF2-40B4-BE49-F238E27FC236}">
+                <a16:creationId xmlns:a16="http://schemas.microsoft.com/office/drawing/2014/main" id="{57740CFC-AD6F-A1A6-DD64-DB25B70B2009}"/>
+              </a:ext>
+            </a:extLst>
+          </p:cNvPr>
+          <p:cNvPicPr>
+            <a:picLocks noChangeAspect="1"/>
+          </p:cNvPicPr>
+          <p:nvPr/>
+        </p:nvPicPr>
+        <p:blipFill>
+          <a:blip r:embed="rId2"/>
+          <a:stretch>
+            <a:fillRect/>
+          </a:stretch>
+        </p:blipFill>
+        <p:spPr>
+          <a:xfrm>
+            <a:off x="2274000" y="911925"/>
+            <a:ext cx="7429500" cy="1790700"/>
+          </a:xfrm>
+          <a:prstGeom prst="rect">
+            <a:avLst/>
+          </a:prstGeom>
+        </p:spPr>
+      </p:pic>
+      <p:sp>
+        <p:nvSpPr>
+          <p:cNvPr id="5" name="Rectangle 4">
+            <a:extLst>
+              <a:ext uri="{FF2B5EF4-FFF2-40B4-BE49-F238E27FC236}">
+                <a16:creationId xmlns:a16="http://schemas.microsoft.com/office/drawing/2014/main" id="{1942441F-0DD6-C601-7A5F-FCA5837886A4}"/>
+              </a:ext>
+            </a:extLst>
+          </p:cNvPr>
+          <p:cNvSpPr/>
+          <p:nvPr/>
+        </p:nvSpPr>
+        <p:spPr>
+          <a:xfrm>
+            <a:off x="8501064" y="4617150"/>
+            <a:ext cx="1757362" cy="457200"/>
+          </a:xfrm>
+          <a:prstGeom prst="rect">
+            <a:avLst/>
+          </a:prstGeom>
+          <a:ln>
+            <a:solidFill>
+              <a:schemeClr val="bg1"/>
+            </a:solidFill>
+          </a:ln>
+        </p:spPr>
+        <p:style>
+          <a:lnRef idx="2">
+            <a:schemeClr val="accent6"/>
+          </a:lnRef>
+          <a:fillRef idx="1">
+            <a:schemeClr val="lt1"/>
+          </a:fillRef>
+          <a:effectRef idx="0">
+            <a:schemeClr val="accent6"/>
+          </a:effectRef>
+          <a:fontRef idx="minor">
+            <a:schemeClr val="dk1"/>
+          </a:fontRef>
+        </p:style>
+        <p:txBody>
+          <a:bodyPr rtlCol="0" anchor="ctr"/>
+          <a:lstStyle/>
+          <a:p>
+            <a:pPr algn="ctr"/>
+            <a:endParaRPr lang="en-NL"/>
+          </a:p>
+        </p:txBody>
+      </p:sp>
+      <p:pic>
+        <p:nvPicPr>
+          <p:cNvPr id="6" name="Picture 5" descr="A screenshot of a computer&#10;&#10;Description automatically generated">
+            <a:extLst>
+              <a:ext uri="{FF2B5EF4-FFF2-40B4-BE49-F238E27FC236}">
+                <a16:creationId xmlns:a16="http://schemas.microsoft.com/office/drawing/2014/main" id="{457133B6-3A46-5B6E-CE74-5E778213C396}"/>
+              </a:ext>
+            </a:extLst>
+          </p:cNvPr>
+          <p:cNvPicPr>
+            <a:picLocks noChangeAspect="1"/>
+          </p:cNvPicPr>
+          <p:nvPr/>
+        </p:nvPicPr>
+        <p:blipFill>
+          <a:blip r:embed="rId3"/>
+          <a:stretch>
+            <a:fillRect/>
+          </a:stretch>
+        </p:blipFill>
+        <p:spPr>
+          <a:xfrm>
+            <a:off x="2374900" y="3426713"/>
+            <a:ext cx="7442200" cy="2095500"/>
+          </a:xfrm>
+          <a:prstGeom prst="rect">
+            <a:avLst/>
+          </a:prstGeom>
+        </p:spPr>
+      </p:pic>
+      <p:sp>
+        <p:nvSpPr>
+          <p:cNvPr id="7" name="Rectangle 6">
+            <a:extLst>
+              <a:ext uri="{FF2B5EF4-FFF2-40B4-BE49-F238E27FC236}">
+                <a16:creationId xmlns:a16="http://schemas.microsoft.com/office/drawing/2014/main" id="{A163FEBB-96FF-D331-4CD8-76197778E0D1}"/>
+              </a:ext>
+            </a:extLst>
+          </p:cNvPr>
+          <p:cNvSpPr/>
+          <p:nvPr/>
+        </p:nvSpPr>
+        <p:spPr>
+          <a:xfrm>
+            <a:off x="7500938" y="2240850"/>
+            <a:ext cx="2028826" cy="457200"/>
+          </a:xfrm>
+          <a:prstGeom prst="rect">
+            <a:avLst/>
+          </a:prstGeom>
+          <a:ln>
+            <a:solidFill>
+              <a:schemeClr val="bg1"/>
+            </a:solidFill>
+          </a:ln>
+        </p:spPr>
+        <p:style>
+          <a:lnRef idx="2">
+            <a:schemeClr val="accent6"/>
+          </a:lnRef>
+          <a:fillRef idx="1">
+            <a:schemeClr val="lt1"/>
+          </a:fillRef>
+          <a:effectRef idx="0">
+            <a:schemeClr val="accent6"/>
+          </a:effectRef>
+          <a:fontRef idx="minor">
+            <a:schemeClr val="dk1"/>
+          </a:fontRef>
+        </p:style>
+        <p:txBody>
+          <a:bodyPr rtlCol="0" anchor="ctr"/>
+          <a:lstStyle/>
+          <a:p>
+            <a:pPr algn="ctr"/>
+            <a:endParaRPr lang="en-NL"/>
+          </a:p>
+        </p:txBody>
+      </p:sp>
+      <p:sp>
+        <p:nvSpPr>
+          <p:cNvPr id="8" name="Rectangle 7">
+            <a:extLst>
+              <a:ext uri="{FF2B5EF4-FFF2-40B4-BE49-F238E27FC236}">
+                <a16:creationId xmlns:a16="http://schemas.microsoft.com/office/drawing/2014/main" id="{653FDC78-E4B3-5915-D862-103D549FC57C}"/>
+              </a:ext>
+            </a:extLst>
+          </p:cNvPr>
+          <p:cNvSpPr/>
+          <p:nvPr/>
+        </p:nvSpPr>
+        <p:spPr>
+          <a:xfrm>
+            <a:off x="7486651" y="4841082"/>
+            <a:ext cx="2028826" cy="457200"/>
+          </a:xfrm>
+          <a:prstGeom prst="rect">
+            <a:avLst/>
+          </a:prstGeom>
+          <a:ln>
+            <a:solidFill>
+              <a:schemeClr val="bg1"/>
+            </a:solidFill>
+          </a:ln>
+        </p:spPr>
+        <p:style>
+          <a:lnRef idx="2">
+            <a:schemeClr val="accent6"/>
+          </a:lnRef>
+          <a:fillRef idx="1">
+            <a:schemeClr val="lt1"/>
+          </a:fillRef>
+          <a:effectRef idx="0">
+            <a:schemeClr val="accent6"/>
+          </a:effectRef>
+          <a:fontRef idx="minor">
+            <a:schemeClr val="dk1"/>
+          </a:fontRef>
+        </p:style>
+        <p:txBody>
+          <a:bodyPr rtlCol="0" anchor="ctr"/>
+          <a:lstStyle/>
+          <a:p>
+            <a:pPr algn="ctr"/>
+            <a:endParaRPr lang="en-NL"/>
+          </a:p>
+        </p:txBody>
+      </p:sp>
+      <p:cxnSp>
+        <p:nvCxnSpPr>
+          <p:cNvPr id="9" name="Straight Arrow Connector 8">
+            <a:extLst>
+              <a:ext uri="{FF2B5EF4-FFF2-40B4-BE49-F238E27FC236}">
+                <a16:creationId xmlns:a16="http://schemas.microsoft.com/office/drawing/2014/main" id="{4E80C2E5-D0ED-0E1B-FE17-DC75C7145E92}"/>
+              </a:ext>
+            </a:extLst>
+          </p:cNvPr>
+          <p:cNvCxnSpPr>
+            <a:cxnSpLocks/>
+          </p:cNvCxnSpPr>
+          <p:nvPr/>
+        </p:nvCxnSpPr>
+        <p:spPr>
+          <a:xfrm flipH="1">
+            <a:off x="3486149" y="5310282"/>
+            <a:ext cx="871539" cy="0"/>
+          </a:xfrm>
+          <a:prstGeom prst="straightConnector1">
+            <a:avLst/>
+          </a:prstGeom>
+          <a:ln w="50800">
+            <a:tailEnd type="triangle"/>
+          </a:ln>
+        </p:spPr>
+        <p:style>
+          <a:lnRef idx="3">
+            <a:schemeClr val="accent5"/>
+          </a:lnRef>
+          <a:fillRef idx="0">
+            <a:schemeClr val="accent5"/>
+          </a:fillRef>
+          <a:effectRef idx="2">
+            <a:schemeClr val="accent5"/>
+          </a:effectRef>
+          <a:fontRef idx="minor">
+            <a:schemeClr val="tx1"/>
+          </a:fontRef>
+        </p:style>
+      </p:cxnSp>
+    </p:spTree>
+    <p:extLst>
+      <p:ext uri="{BB962C8B-B14F-4D97-AF65-F5344CB8AC3E}">
+        <p14:creationId xmlns:p14="http://schemas.microsoft.com/office/powerpoint/2010/main" val="2517367051"/>
+      </p:ext>
+    </p:extLst>
+  </p:cSld>
+  <p:clrMapOvr>
+    <a:masterClrMapping/>
+  </p:clrMapOvr>
+</p:sld>
+</file>
+
+<file path=ppt/slides/slide5.xml><?xml version="1.0" encoding="utf-8"?>
+<p:sld xmlns:a="http://schemas.openxmlformats.org/drawingml/2006/main" xmlns:r="http://schemas.openxmlformats.org/officeDocument/2006/relationships" xmlns:p="http://schemas.openxmlformats.org/presentationml/2006/main">
+  <p:cSld>
+    <p:spTree>
+      <p:nvGrpSpPr>
+        <p:cNvPr id="1" name=""/>
+        <p:cNvGrpSpPr/>
+        <p:nvPr/>
+      </p:nvGrpSpPr>
+      <p:grpSpPr>
+        <a:xfrm>
+          <a:off x="0" y="0"/>
+          <a:ext cx="0" cy="0"/>
+          <a:chOff x="0" y="0"/>
+          <a:chExt cx="0" cy="0"/>
+        </a:xfrm>
+      </p:grpSpPr>
+      <p:sp>
+        <p:nvSpPr>
+          <p:cNvPr id="2" name="Title 1">
+            <a:extLst>
+              <a:ext uri="{FF2B5EF4-FFF2-40B4-BE49-F238E27FC236}">
+                <a16:creationId xmlns:a16="http://schemas.microsoft.com/office/drawing/2014/main" id="{77945745-7619-8585-F352-729A6EB0E9EB}"/>
+              </a:ext>
+            </a:extLst>
+          </p:cNvPr>
+          <p:cNvSpPr>
+            <a:spLocks noGrp="1"/>
+          </p:cNvSpPr>
+          <p:nvPr>
+            <p:ph type="title"/>
+          </p:nvPr>
+        </p:nvSpPr>
+        <p:spPr/>
+        <p:txBody>
+          <a:bodyPr/>
+          <a:lstStyle/>
+          <a:p>
+            <a:endParaRPr lang="en-NL"/>
+          </a:p>
+        </p:txBody>
+      </p:sp>
+      <p:pic>
+        <p:nvPicPr>
+          <p:cNvPr id="4" name="Picture 3" descr="A screenshot of a computer&#10;&#10;Description automatically generated">
+            <a:extLst>
+              <a:ext uri="{FF2B5EF4-FFF2-40B4-BE49-F238E27FC236}">
+                <a16:creationId xmlns:a16="http://schemas.microsoft.com/office/drawing/2014/main" id="{1EC1CBEE-D9C5-D489-7E21-0F1E8317BF68}"/>
+              </a:ext>
+            </a:extLst>
+          </p:cNvPr>
+          <p:cNvPicPr>
+            <a:picLocks noChangeAspect="1"/>
+          </p:cNvPicPr>
+          <p:nvPr/>
+        </p:nvPicPr>
+        <p:blipFill>
+          <a:blip r:embed="rId2"/>
+          <a:stretch>
+            <a:fillRect/>
+          </a:stretch>
+        </p:blipFill>
+        <p:spPr>
+          <a:xfrm>
+            <a:off x="3086025" y="2070025"/>
+            <a:ext cx="4076700" cy="1917700"/>
+          </a:xfrm>
+          <a:prstGeom prst="rect">
+            <a:avLst/>
+          </a:prstGeom>
+        </p:spPr>
+      </p:pic>
+      <p:pic>
+        <p:nvPicPr>
+          <p:cNvPr id="5" name="Picture 4" descr="A screenshot of a computer&#10;&#10;Description automatically generated">
+            <a:extLst>
+              <a:ext uri="{FF2B5EF4-FFF2-40B4-BE49-F238E27FC236}">
+                <a16:creationId xmlns:a16="http://schemas.microsoft.com/office/drawing/2014/main" id="{9B0056DC-FA05-AADD-F91D-36B318568F78}"/>
+              </a:ext>
+            </a:extLst>
+          </p:cNvPr>
+          <p:cNvPicPr>
+            <a:picLocks noChangeAspect="1"/>
+          </p:cNvPicPr>
+          <p:nvPr/>
+        </p:nvPicPr>
+        <p:blipFill>
+          <a:blip r:embed="rId3"/>
+          <a:stretch>
+            <a:fillRect/>
+          </a:stretch>
+        </p:blipFill>
+        <p:spPr>
+          <a:xfrm>
+            <a:off x="5980850" y="2870937"/>
+            <a:ext cx="4102100" cy="1930400"/>
+          </a:xfrm>
+          <a:prstGeom prst="rect">
+            <a:avLst/>
+          </a:prstGeom>
+        </p:spPr>
+      </p:pic>
+    </p:spTree>
+    <p:extLst>
+      <p:ext uri="{BB962C8B-B14F-4D97-AF65-F5344CB8AC3E}">
+        <p14:creationId xmlns:p14="http://schemas.microsoft.com/office/powerpoint/2010/main" val="2565275762"/>
+      </p:ext>
+    </p:extLst>
+  </p:cSld>
+  <p:clrMapOvr>
+    <a:masterClrMapping/>
+  </p:clrMapOvr>
+</p:sld>
+</file>
+
+<file path=ppt/slides/slide6.xml><?xml version="1.0" encoding="utf-8"?>
+<p:sld xmlns:a="http://schemas.openxmlformats.org/drawingml/2006/main" xmlns:r="http://schemas.openxmlformats.org/officeDocument/2006/relationships" xmlns:p="http://schemas.openxmlformats.org/presentationml/2006/main">
+  <p:cSld>
+    <p:spTree>
+      <p:nvGrpSpPr>
+        <p:cNvPr id="1" name=""/>
+        <p:cNvGrpSpPr/>
+        <p:nvPr/>
+      </p:nvGrpSpPr>
+      <p:grpSpPr>
+        <a:xfrm>
+          <a:off x="0" y="0"/>
+          <a:ext cx="0" cy="0"/>
+          <a:chOff x="0" y="0"/>
+          <a:chExt cx="0" cy="0"/>
+        </a:xfrm>
+      </p:grpSpPr>
+      <p:pic>
+        <p:nvPicPr>
+          <p:cNvPr id="5" name="Picture 4" descr="A screenshot of a computer&#10;&#10;Description automatically generated">
+            <a:extLst>
+              <a:ext uri="{FF2B5EF4-FFF2-40B4-BE49-F238E27FC236}">
+                <a16:creationId xmlns:a16="http://schemas.microsoft.com/office/drawing/2014/main" id="{1A0F7872-14A2-6C89-2EB3-6B00E4B816AA}"/>
+              </a:ext>
+            </a:extLst>
+          </p:cNvPr>
+          <p:cNvPicPr>
+            <a:picLocks noChangeAspect="1"/>
+          </p:cNvPicPr>
+          <p:nvPr/>
+        </p:nvPicPr>
+        <p:blipFill>
+          <a:blip r:embed="rId2"/>
+          <a:stretch>
+            <a:fillRect/>
+          </a:stretch>
+        </p:blipFill>
+        <p:spPr>
+          <a:xfrm>
+            <a:off x="2012950" y="1251763"/>
+            <a:ext cx="7366000" cy="1930400"/>
+          </a:xfrm>
+          <a:prstGeom prst="rect">
+            <a:avLst/>
+          </a:prstGeom>
+        </p:spPr>
+      </p:pic>
+      <p:pic>
+        <p:nvPicPr>
+          <p:cNvPr id="7" name="Picture 6" descr="A screenshot of a computer&#10;&#10;Description automatically generated">
+            <a:extLst>
+              <a:ext uri="{FF2B5EF4-FFF2-40B4-BE49-F238E27FC236}">
+                <a16:creationId xmlns:a16="http://schemas.microsoft.com/office/drawing/2014/main" id="{23C89336-4D42-7D8A-378D-525C8474AC9C}"/>
+              </a:ext>
+            </a:extLst>
+          </p:cNvPr>
+          <p:cNvPicPr>
+            <a:picLocks noChangeAspect="1"/>
+          </p:cNvPicPr>
+          <p:nvPr/>
+        </p:nvPicPr>
+        <p:blipFill>
+          <a:blip r:embed="rId3"/>
+          <a:stretch>
+            <a:fillRect/>
+          </a:stretch>
+        </p:blipFill>
+        <p:spPr>
+          <a:xfrm>
+            <a:off x="2518550" y="4641037"/>
+            <a:ext cx="7454900" cy="2019300"/>
+          </a:xfrm>
+          <a:prstGeom prst="rect">
+            <a:avLst/>
+          </a:prstGeom>
+        </p:spPr>
+      </p:pic>
+      <p:sp>
+        <p:nvSpPr>
+          <p:cNvPr id="18" name="Rectangle 17">
+            <a:extLst>
+              <a:ext uri="{FF2B5EF4-FFF2-40B4-BE49-F238E27FC236}">
+                <a16:creationId xmlns:a16="http://schemas.microsoft.com/office/drawing/2014/main" id="{F2A08C4A-68B5-CA36-245B-2C25E58808A1}"/>
+              </a:ext>
+            </a:extLst>
+          </p:cNvPr>
+          <p:cNvSpPr/>
+          <p:nvPr/>
+        </p:nvSpPr>
+        <p:spPr>
+          <a:xfrm>
+            <a:off x="7200901" y="2555175"/>
+            <a:ext cx="2028826" cy="457200"/>
+          </a:xfrm>
+          <a:prstGeom prst="rect">
+            <a:avLst/>
+          </a:prstGeom>
+          <a:ln>
+            <a:solidFill>
+              <a:schemeClr val="bg1"/>
+            </a:solidFill>
+          </a:ln>
+        </p:spPr>
+        <p:style>
+          <a:lnRef idx="2">
+            <a:schemeClr val="accent6"/>
+          </a:lnRef>
+          <a:fillRef idx="1">
+            <a:schemeClr val="lt1"/>
+          </a:fillRef>
+          <a:effectRef idx="0">
+            <a:schemeClr val="accent6"/>
+          </a:effectRef>
+          <a:fontRef idx="minor">
+            <a:schemeClr val="dk1"/>
+          </a:fontRef>
+        </p:style>
+        <p:txBody>
+          <a:bodyPr rtlCol="0" anchor="ctr"/>
+          <a:lstStyle/>
+          <a:p>
+            <a:pPr algn="ctr"/>
+            <a:endParaRPr lang="en-NL"/>
+          </a:p>
+        </p:txBody>
+      </p:sp>
+      <p:cxnSp>
+        <p:nvCxnSpPr>
+          <p:cNvPr id="19" name="Straight Arrow Connector 18">
+            <a:extLst>
+              <a:ext uri="{FF2B5EF4-FFF2-40B4-BE49-F238E27FC236}">
+                <a16:creationId xmlns:a16="http://schemas.microsoft.com/office/drawing/2014/main" id="{6CCF9951-0A55-F170-A0ED-073DD89F1BFA}"/>
+              </a:ext>
+            </a:extLst>
+          </p:cNvPr>
+          <p:cNvCxnSpPr>
+            <a:cxnSpLocks/>
+          </p:cNvCxnSpPr>
+          <p:nvPr/>
+        </p:nvCxnSpPr>
+        <p:spPr>
+          <a:xfrm flipH="1">
+            <a:off x="5300663" y="2814638"/>
+            <a:ext cx="795337" cy="0"/>
+          </a:xfrm>
+          <a:prstGeom prst="straightConnector1">
+            <a:avLst/>
+          </a:prstGeom>
+          <a:ln w="50800">
+            <a:tailEnd type="triangle"/>
+          </a:ln>
+        </p:spPr>
+        <p:style>
+          <a:lnRef idx="3">
+            <a:schemeClr val="accent5"/>
+          </a:lnRef>
+          <a:fillRef idx="0">
+            <a:schemeClr val="accent5"/>
+          </a:fillRef>
+          <a:effectRef idx="2">
+            <a:schemeClr val="accent5"/>
+          </a:effectRef>
+          <a:fontRef idx="minor">
+            <a:schemeClr val="tx1"/>
+          </a:fontRef>
+        </p:style>
+      </p:cxnSp>
+      <p:cxnSp>
+        <p:nvCxnSpPr>
+          <p:cNvPr id="21" name="Straight Arrow Connector 20">
+            <a:extLst>
+              <a:ext uri="{FF2B5EF4-FFF2-40B4-BE49-F238E27FC236}">
+                <a16:creationId xmlns:a16="http://schemas.microsoft.com/office/drawing/2014/main" id="{15E75E56-12E9-BA29-EE1D-2931A7C37E88}"/>
+              </a:ext>
+            </a:extLst>
+          </p:cNvPr>
+          <p:cNvCxnSpPr>
+            <a:cxnSpLocks/>
+          </p:cNvCxnSpPr>
+          <p:nvPr/>
+        </p:nvCxnSpPr>
+        <p:spPr>
+          <a:xfrm flipH="1">
+            <a:off x="7415214" y="1995319"/>
+            <a:ext cx="800100" cy="0"/>
+          </a:xfrm>
+          <a:prstGeom prst="straightConnector1">
+            <a:avLst/>
+          </a:prstGeom>
+          <a:ln w="50800">
+            <a:tailEnd type="triangle"/>
+          </a:ln>
+        </p:spPr>
+        <p:style>
+          <a:lnRef idx="3">
+            <a:schemeClr val="accent5"/>
+          </a:lnRef>
+          <a:fillRef idx="0">
+            <a:schemeClr val="accent5"/>
+          </a:fillRef>
+          <a:effectRef idx="2">
+            <a:schemeClr val="accent5"/>
+          </a:effectRef>
+          <a:fontRef idx="minor">
+            <a:schemeClr val="tx1"/>
+          </a:fontRef>
+        </p:style>
+      </p:cxnSp>
+    </p:spTree>
+    <p:extLst>
+      <p:ext uri="{BB962C8B-B14F-4D97-AF65-F5344CB8AC3E}">
+        <p14:creationId xmlns:p14="http://schemas.microsoft.com/office/powerpoint/2010/main" val="1348524848"/>
+      </p:ext>
+    </p:extLst>
+  </p:cSld>
+  <p:clrMapOvr>
+    <a:masterClrMapping/>
+  </p:clrMapOvr>
+</p:sld>
+</file>
+
+<file path=ppt/slides/slide7.xml><?xml version="1.0" encoding="utf-8"?>
+<p:sld xmlns:a="http://schemas.openxmlformats.org/drawingml/2006/main" xmlns:r="http://schemas.openxmlformats.org/officeDocument/2006/relationships" xmlns:p="http://schemas.openxmlformats.org/presentationml/2006/main">
+  <p:cSld>
+    <p:spTree>
+      <p:nvGrpSpPr>
+        <p:cNvPr id="1" name=""/>
+        <p:cNvGrpSpPr/>
+        <p:nvPr/>
+      </p:nvGrpSpPr>
+      <p:grpSpPr>
+        <a:xfrm>
+          <a:off x="0" y="0"/>
+          <a:ext cx="0" cy="0"/>
+          <a:chOff x="0" y="0"/>
+          <a:chExt cx="0" cy="0"/>
+        </a:xfrm>
+      </p:grpSpPr>
+      <p:sp>
+        <p:nvSpPr>
+          <p:cNvPr id="6" name="Rectangle 5">
+            <a:extLst>
+              <a:ext uri="{FF2B5EF4-FFF2-40B4-BE49-F238E27FC236}">
+                <a16:creationId xmlns:a16="http://schemas.microsoft.com/office/drawing/2014/main" id="{64FCFB6C-D5D2-2F78-F93B-829348B8294F}"/>
+              </a:ext>
+            </a:extLst>
+          </p:cNvPr>
+          <p:cNvSpPr/>
+          <p:nvPr/>
+        </p:nvSpPr>
+        <p:spPr>
+          <a:xfrm>
+            <a:off x="7000876" y="2971800"/>
+            <a:ext cx="1543050" cy="457200"/>
+          </a:xfrm>
+          <a:prstGeom prst="rect">
+            <a:avLst/>
+          </a:prstGeom>
+          <a:ln>
+            <a:solidFill>
+              <a:schemeClr val="bg1"/>
+            </a:solidFill>
+          </a:ln>
+        </p:spPr>
+        <p:style>
+          <a:lnRef idx="2">
+            <a:schemeClr val="accent6"/>
+          </a:lnRef>
+          <a:fillRef idx="1">
+            <a:schemeClr val="lt1"/>
+          </a:fillRef>
+          <a:effectRef idx="0">
+            <a:schemeClr val="accent6"/>
+          </a:effectRef>
+          <a:fontRef idx="minor">
+            <a:schemeClr val="dk1"/>
+          </a:fontRef>
+        </p:style>
+        <p:txBody>
+          <a:bodyPr rtlCol="0" anchor="ctr"/>
+          <a:lstStyle/>
+          <a:p>
+            <a:pPr algn="ctr"/>
+            <a:endParaRPr lang="en-NL"/>
+          </a:p>
+        </p:txBody>
+      </p:sp>
+      <p:pic>
+        <p:nvPicPr>
+          <p:cNvPr id="14" name="Picture 13" descr="A screenshot of a computer&#10;&#10;Description automatically generated">
+            <a:extLst>
+              <a:ext uri="{FF2B5EF4-FFF2-40B4-BE49-F238E27FC236}">
+                <a16:creationId xmlns:a16="http://schemas.microsoft.com/office/drawing/2014/main" id="{0F77FEAA-910F-FF43-F7FC-26167AC170E9}"/>
+              </a:ext>
+            </a:extLst>
+          </p:cNvPr>
+          <p:cNvPicPr>
+            <a:picLocks noChangeAspect="1"/>
+          </p:cNvPicPr>
+          <p:nvPr/>
+        </p:nvPicPr>
+        <p:blipFill>
+          <a:blip r:embed="rId2"/>
+          <a:stretch>
+            <a:fillRect/>
+          </a:stretch>
+        </p:blipFill>
+        <p:spPr>
+          <a:xfrm>
+            <a:off x="8321084" y="2194748"/>
+            <a:ext cx="4051300" cy="1854200"/>
+          </a:xfrm>
+          <a:prstGeom prst="rect">
+            <a:avLst/>
+          </a:prstGeom>
+        </p:spPr>
+      </p:pic>
+      <p:pic>
+        <p:nvPicPr>
+          <p:cNvPr id="16" name="Picture 15" descr="A screenshot of a computer&#10;&#10;Description automatically generated">
+            <a:extLst>
+              <a:ext uri="{FF2B5EF4-FFF2-40B4-BE49-F238E27FC236}">
+                <a16:creationId xmlns:a16="http://schemas.microsoft.com/office/drawing/2014/main" id="{BBC988AC-3D70-6879-486A-C03DD7E1F96A}"/>
+              </a:ext>
+            </a:extLst>
+          </p:cNvPr>
+          <p:cNvPicPr>
+            <a:picLocks noChangeAspect="1"/>
+          </p:cNvPicPr>
+          <p:nvPr/>
+        </p:nvPicPr>
+        <p:blipFill>
+          <a:blip r:embed="rId3"/>
+          <a:stretch>
+            <a:fillRect/>
+          </a:stretch>
+        </p:blipFill>
+        <p:spPr>
+          <a:xfrm>
+            <a:off x="1711178" y="1127628"/>
+            <a:ext cx="4950120" cy="4602743"/>
+          </a:xfrm>
+          <a:prstGeom prst="rect">
+            <a:avLst/>
+          </a:prstGeom>
+        </p:spPr>
+      </p:pic>
+      <p:cxnSp>
+        <p:nvCxnSpPr>
+          <p:cNvPr id="7" name="Straight Arrow Connector 6">
+            <a:extLst>
+              <a:ext uri="{FF2B5EF4-FFF2-40B4-BE49-F238E27FC236}">
+                <a16:creationId xmlns:a16="http://schemas.microsoft.com/office/drawing/2014/main" id="{CF61D203-0095-B1F7-0D32-EF160A3FF1F3}"/>
+              </a:ext>
+            </a:extLst>
+          </p:cNvPr>
+          <p:cNvCxnSpPr>
+            <a:cxnSpLocks/>
+          </p:cNvCxnSpPr>
+          <p:nvPr/>
+        </p:nvCxnSpPr>
+        <p:spPr>
+          <a:xfrm flipH="1">
+            <a:off x="3890962" y="3072635"/>
+            <a:ext cx="623888" cy="0"/>
+          </a:xfrm>
+          <a:prstGeom prst="straightConnector1">
+            <a:avLst/>
+          </a:prstGeom>
+          <a:ln w="50800">
+            <a:tailEnd type="triangle"/>
+          </a:ln>
+        </p:spPr>
+        <p:style>
+          <a:lnRef idx="3">
+            <a:schemeClr val="accent5"/>
+          </a:lnRef>
+          <a:fillRef idx="0">
+            <a:schemeClr val="accent5"/>
+          </a:fillRef>
+          <a:effectRef idx="2">
+            <a:schemeClr val="accent5"/>
+          </a:effectRef>
+          <a:fontRef idx="minor">
+            <a:schemeClr val="tx1"/>
+          </a:fontRef>
+        </p:style>
+      </p:cxnSp>
+      <p:sp>
+        <p:nvSpPr>
+          <p:cNvPr id="8" name="Rectangle 7">
+            <a:extLst>
+              <a:ext uri="{FF2B5EF4-FFF2-40B4-BE49-F238E27FC236}">
+                <a16:creationId xmlns:a16="http://schemas.microsoft.com/office/drawing/2014/main" id="{CDCA4AA9-1CAC-1DF7-3D58-127B499C7106}"/>
+              </a:ext>
+            </a:extLst>
+          </p:cNvPr>
+          <p:cNvSpPr/>
+          <p:nvPr/>
+        </p:nvSpPr>
+        <p:spPr>
+          <a:xfrm>
+            <a:off x="2428875" y="1394648"/>
+            <a:ext cx="1119188" cy="248415"/>
+          </a:xfrm>
+          <a:prstGeom prst="rect">
+            <a:avLst/>
+          </a:prstGeom>
+          <a:noFill/>
+          <a:ln w="57150">
+            <a:solidFill>
+              <a:srgbClr val="7030A0"/>
+            </a:solidFill>
+          </a:ln>
+        </p:spPr>
+        <p:style>
+          <a:lnRef idx="2">
+            <a:schemeClr val="accent1">
+              <a:shade val="15000"/>
+            </a:schemeClr>
+          </a:lnRef>
+          <a:fillRef idx="1">
+            <a:schemeClr val="accent1"/>
+          </a:fillRef>
+          <a:effectRef idx="0">
+            <a:schemeClr val="accent1"/>
+          </a:effectRef>
+          <a:fontRef idx="minor">
+            <a:schemeClr val="lt1"/>
+          </a:fontRef>
+        </p:style>
+        <p:txBody>
+          <a:bodyPr rtlCol="0" anchor="ctr"/>
+          <a:lstStyle/>
+          <a:p>
+            <a:pPr algn="ctr"/>
+            <a:endParaRPr lang="en-NL"/>
+          </a:p>
+        </p:txBody>
+      </p:sp>
+      <p:sp>
+        <p:nvSpPr>
+          <p:cNvPr id="19" name="Rectangle 18">
+            <a:extLst>
+              <a:ext uri="{FF2B5EF4-FFF2-40B4-BE49-F238E27FC236}">
+                <a16:creationId xmlns:a16="http://schemas.microsoft.com/office/drawing/2014/main" id="{01A97CBA-A359-3CB2-130E-373479A7FB47}"/>
+              </a:ext>
+            </a:extLst>
+          </p:cNvPr>
+          <p:cNvSpPr/>
+          <p:nvPr/>
+        </p:nvSpPr>
+        <p:spPr>
+          <a:xfrm>
+            <a:off x="4972050" y="2123252"/>
+            <a:ext cx="1514475" cy="457200"/>
+          </a:xfrm>
+          <a:prstGeom prst="rect">
+            <a:avLst/>
+          </a:prstGeom>
+          <a:ln>
+            <a:solidFill>
+              <a:schemeClr val="bg1"/>
+            </a:solidFill>
+          </a:ln>
+        </p:spPr>
+        <p:style>
+          <a:lnRef idx="2">
+            <a:schemeClr val="accent6"/>
+          </a:lnRef>
+          <a:fillRef idx="1">
+            <a:schemeClr val="lt1"/>
+          </a:fillRef>
+          <a:effectRef idx="0">
+            <a:schemeClr val="accent6"/>
+          </a:effectRef>
+          <a:fontRef idx="minor">
+            <a:schemeClr val="dk1"/>
+          </a:fontRef>
+        </p:style>
+        <p:txBody>
+          <a:bodyPr rtlCol="0" anchor="ctr"/>
+          <a:lstStyle/>
+          <a:p>
+            <a:pPr algn="ctr"/>
+            <a:endParaRPr lang="en-NL"/>
+          </a:p>
+        </p:txBody>
+      </p:sp>
+    </p:spTree>
+    <p:extLst>
+      <p:ext uri="{BB962C8B-B14F-4D97-AF65-F5344CB8AC3E}">
+        <p14:creationId xmlns:p14="http://schemas.microsoft.com/office/powerpoint/2010/main" val="3490882405"/>
+      </p:ext>
+    </p:extLst>
+  </p:cSld>
+  <p:clrMapOvr>
+    <a:masterClrMapping/>
+  </p:clrMapOvr>
+</p:sld>
+</file>
+
+<file path=ppt/slides/slide8.xml><?xml version="1.0" encoding="utf-8"?>
+<p:sld xmlns:a="http://schemas.openxmlformats.org/drawingml/2006/main" xmlns:r="http://schemas.openxmlformats.org/officeDocument/2006/relationships" xmlns:p="http://schemas.openxmlformats.org/presentationml/2006/main">
+  <p:cSld>
+    <p:spTree>
+      <p:nvGrpSpPr>
+        <p:cNvPr id="1" name=""/>
+        <p:cNvGrpSpPr/>
+        <p:nvPr/>
+      </p:nvGrpSpPr>
+      <p:grpSpPr>
+        <a:xfrm>
+          <a:off x="0" y="0"/>
+          <a:ext cx="0" cy="0"/>
+          <a:chOff x="0" y="0"/>
+          <a:chExt cx="0" cy="0"/>
+        </a:xfrm>
+      </p:grpSpPr>
+      <p:pic>
+        <p:nvPicPr>
+          <p:cNvPr id="5" name="Picture 4" descr="A screenshot of a computer&#10;&#10;Description automatically generated">
+            <a:extLst>
+              <a:ext uri="{FF2B5EF4-FFF2-40B4-BE49-F238E27FC236}">
+                <a16:creationId xmlns:a16="http://schemas.microsoft.com/office/drawing/2014/main" id="{5CBA5D65-5BAD-B395-7C6D-1D8E20C33E04}"/>
+              </a:ext>
+            </a:extLst>
+          </p:cNvPr>
+          <p:cNvPicPr>
+            <a:picLocks noChangeAspect="1"/>
+          </p:cNvPicPr>
+          <p:nvPr/>
+        </p:nvPicPr>
+        <p:blipFill>
+          <a:blip r:embed="rId2"/>
+          <a:stretch>
+            <a:fillRect/>
+          </a:stretch>
+        </p:blipFill>
+        <p:spPr>
+          <a:xfrm>
+            <a:off x="749300" y="482600"/>
+            <a:ext cx="6578600" cy="2946400"/>
+          </a:xfrm>
+          <a:prstGeom prst="rect">
+            <a:avLst/>
+          </a:prstGeom>
+        </p:spPr>
+      </p:pic>
+      <p:sp>
+        <p:nvSpPr>
+          <p:cNvPr id="6" name="Rectangle 5">
+            <a:extLst>
+              <a:ext uri="{FF2B5EF4-FFF2-40B4-BE49-F238E27FC236}">
+                <a16:creationId xmlns:a16="http://schemas.microsoft.com/office/drawing/2014/main" id="{6DD8144E-1CBE-7522-28EC-39004214CA29}"/>
+              </a:ext>
+            </a:extLst>
+          </p:cNvPr>
+          <p:cNvSpPr/>
+          <p:nvPr/>
+        </p:nvSpPr>
+        <p:spPr>
+          <a:xfrm>
+            <a:off x="4686299" y="1764477"/>
+            <a:ext cx="2243138" cy="1320036"/>
+          </a:xfrm>
+          <a:prstGeom prst="rect">
+            <a:avLst/>
+          </a:prstGeom>
+          <a:ln>
+            <a:solidFill>
+              <a:schemeClr val="bg1"/>
+            </a:solidFill>
+          </a:ln>
+        </p:spPr>
+        <p:style>
+          <a:lnRef idx="2">
+            <a:schemeClr val="accent6"/>
+          </a:lnRef>
+          <a:fillRef idx="1">
+            <a:schemeClr val="lt1"/>
+          </a:fillRef>
+          <a:effectRef idx="0">
+            <a:schemeClr val="accent6"/>
+          </a:effectRef>
+          <a:fontRef idx="minor">
+            <a:schemeClr val="dk1"/>
+          </a:fontRef>
+        </p:style>
+        <p:txBody>
+          <a:bodyPr rtlCol="0" anchor="ctr"/>
+          <a:lstStyle/>
+          <a:p>
+            <a:pPr algn="ctr"/>
+            <a:endParaRPr lang="en-NL"/>
+          </a:p>
+        </p:txBody>
+      </p:sp>
+      <p:cxnSp>
+        <p:nvCxnSpPr>
+          <p:cNvPr id="7" name="Straight Arrow Connector 6">
+            <a:extLst>
+              <a:ext uri="{FF2B5EF4-FFF2-40B4-BE49-F238E27FC236}">
+                <a16:creationId xmlns:a16="http://schemas.microsoft.com/office/drawing/2014/main" id="{2F4F343F-DA47-A4D1-F1F9-60438EF19C7F}"/>
+              </a:ext>
+            </a:extLst>
+          </p:cNvPr>
+          <p:cNvCxnSpPr>
+            <a:cxnSpLocks/>
+          </p:cNvCxnSpPr>
+          <p:nvPr/>
+        </p:nvCxnSpPr>
+        <p:spPr>
+          <a:xfrm flipH="1">
+            <a:off x="2062162" y="2342385"/>
+            <a:ext cx="623888" cy="0"/>
+          </a:xfrm>
+          <a:prstGeom prst="straightConnector1">
+            <a:avLst/>
+          </a:prstGeom>
+          <a:ln w="50800">
+            <a:tailEnd type="triangle"/>
+          </a:ln>
+        </p:spPr>
+        <p:style>
+          <a:lnRef idx="3">
+            <a:schemeClr val="accent5"/>
+          </a:lnRef>
+          <a:fillRef idx="0">
+            <a:schemeClr val="accent5"/>
+          </a:fillRef>
+          <a:effectRef idx="2">
+            <a:schemeClr val="accent5"/>
+          </a:effectRef>
+          <a:fontRef idx="minor">
+            <a:schemeClr val="tx1"/>
+          </a:fontRef>
+        </p:style>
+      </p:cxnSp>
+      <p:cxnSp>
+        <p:nvCxnSpPr>
+          <p:cNvPr id="8" name="Straight Arrow Connector 7">
+            <a:extLst>
+              <a:ext uri="{FF2B5EF4-FFF2-40B4-BE49-F238E27FC236}">
+                <a16:creationId xmlns:a16="http://schemas.microsoft.com/office/drawing/2014/main" id="{448C3B90-AA49-7296-21DA-B42C50C1114F}"/>
+              </a:ext>
+            </a:extLst>
+          </p:cNvPr>
+          <p:cNvCxnSpPr>
+            <a:cxnSpLocks/>
+          </p:cNvCxnSpPr>
+          <p:nvPr/>
+        </p:nvCxnSpPr>
+        <p:spPr>
+          <a:xfrm flipH="1">
+            <a:off x="2686050" y="2923410"/>
+            <a:ext cx="623888" cy="0"/>
+          </a:xfrm>
+          <a:prstGeom prst="straightConnector1">
+            <a:avLst/>
+          </a:prstGeom>
+          <a:ln w="50800">
+            <a:tailEnd type="triangle"/>
+          </a:ln>
+        </p:spPr>
+        <p:style>
+          <a:lnRef idx="3">
+            <a:schemeClr val="accent5"/>
+          </a:lnRef>
+          <a:fillRef idx="0">
+            <a:schemeClr val="accent5"/>
+          </a:fillRef>
+          <a:effectRef idx="2">
+            <a:schemeClr val="accent5"/>
+          </a:effectRef>
+          <a:fontRef idx="minor">
+            <a:schemeClr val="tx1"/>
+          </a:fontRef>
+        </p:style>
+      </p:cxnSp>
+      <p:pic>
+        <p:nvPicPr>
+          <p:cNvPr id="10" name="Picture 9" descr="A screenshot of a computer&#10;&#10;Description automatically generated">
+            <a:extLst>
+              <a:ext uri="{FF2B5EF4-FFF2-40B4-BE49-F238E27FC236}">
+                <a16:creationId xmlns:a16="http://schemas.microsoft.com/office/drawing/2014/main" id="{89494295-1F7D-0783-623D-C99617C20E0B}"/>
+              </a:ext>
+            </a:extLst>
+          </p:cNvPr>
+          <p:cNvPicPr>
+            <a:picLocks noChangeAspect="1"/>
+          </p:cNvPicPr>
+          <p:nvPr/>
+        </p:nvPicPr>
+        <p:blipFill>
+          <a:blip r:embed="rId3"/>
+          <a:stretch>
+            <a:fillRect/>
+          </a:stretch>
+        </p:blipFill>
+        <p:spPr>
+          <a:xfrm>
+            <a:off x="3633787" y="3994915"/>
+            <a:ext cx="6591300" cy="2514600"/>
+          </a:xfrm>
+          <a:prstGeom prst="rect">
+            <a:avLst/>
+          </a:prstGeom>
+        </p:spPr>
+      </p:pic>
+      <p:sp>
+        <p:nvSpPr>
+          <p:cNvPr id="11" name="Rectangle 10">
+            <a:extLst>
+              <a:ext uri="{FF2B5EF4-FFF2-40B4-BE49-F238E27FC236}">
+                <a16:creationId xmlns:a16="http://schemas.microsoft.com/office/drawing/2014/main" id="{CE9775D0-7FE4-9865-3EBE-4CAF790325C7}"/>
+              </a:ext>
+            </a:extLst>
+          </p:cNvPr>
+          <p:cNvSpPr/>
+          <p:nvPr/>
+        </p:nvSpPr>
+        <p:spPr>
+          <a:xfrm>
+            <a:off x="7981949" y="5189479"/>
+            <a:ext cx="1862139" cy="1320036"/>
+          </a:xfrm>
+          <a:prstGeom prst="rect">
+            <a:avLst/>
+          </a:prstGeom>
+          <a:ln>
+            <a:solidFill>
+              <a:schemeClr val="bg1"/>
+            </a:solidFill>
+          </a:ln>
+        </p:spPr>
+        <p:style>
+          <a:lnRef idx="2">
+            <a:schemeClr val="accent6"/>
+          </a:lnRef>
+          <a:fillRef idx="1">
+            <a:schemeClr val="lt1"/>
+          </a:fillRef>
+          <a:effectRef idx="0">
+            <a:schemeClr val="accent6"/>
+          </a:effectRef>
+          <a:fontRef idx="minor">
+            <a:schemeClr val="dk1"/>
+          </a:fontRef>
+        </p:style>
+        <p:txBody>
+          <a:bodyPr rtlCol="0" anchor="ctr"/>
+          <a:lstStyle/>
+          <a:p>
+            <a:pPr algn="ctr"/>
+            <a:endParaRPr lang="en-NL"/>
+          </a:p>
+        </p:txBody>
+      </p:sp>
+    </p:spTree>
+    <p:extLst>
+      <p:ext uri="{BB962C8B-B14F-4D97-AF65-F5344CB8AC3E}">
+        <p14:creationId xmlns:p14="http://schemas.microsoft.com/office/powerpoint/2010/main" val="2426178567"/>
+      </p:ext>
+    </p:extLst>
+  </p:cSld>
+  <p:clrMapOvr>
+    <a:masterClrMapping/>
+  </p:clrMapOvr>
+</p:sld>
+</file>
+
+<file path=ppt/slides/slide9.xml><?xml version="1.0" encoding="utf-8"?>
+<p:sld xmlns:a="http://schemas.openxmlformats.org/drawingml/2006/main" xmlns:r="http://schemas.openxmlformats.org/officeDocument/2006/relationships" xmlns:p="http://schemas.openxmlformats.org/presentationml/2006/main">
+  <p:cSld>
+    <p:spTree>
+      <p:nvGrpSpPr>
+        <p:cNvPr id="1" name=""/>
+        <p:cNvGrpSpPr/>
+        <p:nvPr/>
+      </p:nvGrpSpPr>
+      <p:grpSpPr>
+        <a:xfrm>
+          <a:off x="0" y="0"/>
+          <a:ext cx="0" cy="0"/>
+          <a:chOff x="0" y="0"/>
+          <a:chExt cx="0" cy="0"/>
+        </a:xfrm>
+      </p:grpSpPr>
+      <p:pic>
+        <p:nvPicPr>
+          <p:cNvPr id="5" name="Picture 4" descr="A screenshot of a computer&#10;&#10;Description automatically generated">
+            <a:extLst>
+              <a:ext uri="{FF2B5EF4-FFF2-40B4-BE49-F238E27FC236}">
+                <a16:creationId xmlns:a16="http://schemas.microsoft.com/office/drawing/2014/main" id="{8294169B-B182-00E2-D4F3-EC7BF8A2926F}"/>
+              </a:ext>
+            </a:extLst>
+          </p:cNvPr>
+          <p:cNvPicPr>
+            <a:picLocks noChangeAspect="1"/>
+          </p:cNvPicPr>
+          <p:nvPr/>
+        </p:nvPicPr>
+        <p:blipFill>
+          <a:blip r:embed="rId2"/>
+          <a:stretch>
+            <a:fillRect/>
+          </a:stretch>
+        </p:blipFill>
+        <p:spPr>
+          <a:xfrm>
+            <a:off x="853916" y="180109"/>
+            <a:ext cx="7772400" cy="5084153"/>
+          </a:xfrm>
+          <a:prstGeom prst="rect">
+            <a:avLst/>
+          </a:prstGeom>
+        </p:spPr>
+      </p:pic>
+      <p:sp>
+        <p:nvSpPr>
+          <p:cNvPr id="6" name="Rectangle 5">
+            <a:extLst>
+              <a:ext uri="{FF2B5EF4-FFF2-40B4-BE49-F238E27FC236}">
+                <a16:creationId xmlns:a16="http://schemas.microsoft.com/office/drawing/2014/main" id="{99FA308C-DF5B-EAF0-3480-E06B6AB35DA6}"/>
+              </a:ext>
+            </a:extLst>
+          </p:cNvPr>
+          <p:cNvSpPr/>
+          <p:nvPr/>
+        </p:nvSpPr>
+        <p:spPr>
+          <a:xfrm>
+            <a:off x="7695247" y="2879819"/>
+            <a:ext cx="797590" cy="1320036"/>
+          </a:xfrm>
+          <a:prstGeom prst="rect">
+            <a:avLst/>
+          </a:prstGeom>
+          <a:ln>
+            <a:solidFill>
+              <a:schemeClr val="bg1"/>
+            </a:solidFill>
+          </a:ln>
+        </p:spPr>
+        <p:style>
+          <a:lnRef idx="2">
+            <a:schemeClr val="accent6"/>
+          </a:lnRef>
+          <a:fillRef idx="1">
+            <a:schemeClr val="lt1"/>
+          </a:fillRef>
+          <a:effectRef idx="0">
+            <a:schemeClr val="accent6"/>
+          </a:effectRef>
+          <a:fontRef idx="minor">
+            <a:schemeClr val="dk1"/>
+          </a:fontRef>
+        </p:style>
+        <p:txBody>
+          <a:bodyPr rtlCol="0" anchor="ctr"/>
+          <a:lstStyle/>
+          <a:p>
+            <a:pPr algn="ctr"/>
+            <a:endParaRPr lang="en-NL"/>
+          </a:p>
+        </p:txBody>
+      </p:sp>
+      <p:cxnSp>
+        <p:nvCxnSpPr>
+          <p:cNvPr id="7" name="Straight Arrow Connector 6">
+            <a:extLst>
+              <a:ext uri="{FF2B5EF4-FFF2-40B4-BE49-F238E27FC236}">
+                <a16:creationId xmlns:a16="http://schemas.microsoft.com/office/drawing/2014/main" id="{538BF03A-7AF0-B908-1DE0-8425FE4C0995}"/>
+              </a:ext>
+            </a:extLst>
+          </p:cNvPr>
+          <p:cNvCxnSpPr>
+            <a:cxnSpLocks/>
+          </p:cNvCxnSpPr>
+          <p:nvPr/>
+        </p:nvCxnSpPr>
+        <p:spPr>
+          <a:xfrm flipH="1">
+            <a:off x="7576271" y="3190394"/>
+            <a:ext cx="623888" cy="0"/>
+          </a:xfrm>
+          <a:prstGeom prst="straightConnector1">
+            <a:avLst/>
+          </a:prstGeom>
+          <a:ln w="50800">
+            <a:tailEnd type="triangle"/>
+          </a:ln>
+        </p:spPr>
+        <p:style>
+          <a:lnRef idx="3">
+            <a:schemeClr val="accent5"/>
+          </a:lnRef>
+          <a:fillRef idx="0">
+            <a:schemeClr val="accent5"/>
+          </a:fillRef>
+          <a:effectRef idx="2">
+            <a:schemeClr val="accent5"/>
+          </a:effectRef>
+          <a:fontRef idx="minor">
+            <a:schemeClr val="tx1"/>
+          </a:fontRef>
+        </p:style>
+      </p:cxnSp>
+      <p:cxnSp>
+        <p:nvCxnSpPr>
+          <p:cNvPr id="8" name="Straight Arrow Connector 7">
+            <a:extLst>
+              <a:ext uri="{FF2B5EF4-FFF2-40B4-BE49-F238E27FC236}">
+                <a16:creationId xmlns:a16="http://schemas.microsoft.com/office/drawing/2014/main" id="{E7FD5E99-A3A8-1C30-28D2-E5EE2132B47F}"/>
+              </a:ext>
+            </a:extLst>
+          </p:cNvPr>
+          <p:cNvCxnSpPr>
+            <a:cxnSpLocks/>
+          </p:cNvCxnSpPr>
+          <p:nvPr/>
+        </p:nvCxnSpPr>
+        <p:spPr>
+          <a:xfrm flipV="1">
+            <a:off x="8035204" y="585740"/>
+            <a:ext cx="0" cy="370223"/>
+          </a:xfrm>
+          <a:prstGeom prst="straightConnector1">
+            <a:avLst/>
+          </a:prstGeom>
+          <a:ln w="50800">
+            <a:tailEnd type="triangle"/>
+          </a:ln>
+        </p:spPr>
+        <p:style>
+          <a:lnRef idx="3">
+            <a:schemeClr val="accent5"/>
+          </a:lnRef>
+          <a:fillRef idx="0">
+            <a:schemeClr val="accent5"/>
+          </a:fillRef>
+          <a:effectRef idx="2">
+            <a:schemeClr val="accent5"/>
+          </a:effectRef>
+          <a:fontRef idx="minor">
+            <a:schemeClr val="tx1"/>
+          </a:fontRef>
+        </p:style>
+      </p:cxnSp>
+    </p:spTree>
+    <p:extLst>
+      <p:ext uri="{BB962C8B-B14F-4D97-AF65-F5344CB8AC3E}">
+        <p14:creationId xmlns:p14="http://schemas.microsoft.com/office/powerpoint/2010/main" val="1103802627"/>
       </p:ext>
     </p:extLst>
   </p:cSld>

</xml_diff>